<commit_message>
Iterate on lecture 2
</commit_message>
<xml_diff>
--- a/slides/CSFG6.pptx
+++ b/slides/CSFG6.pptx
@@ -1,6 +1,6 @@
 
 <file path=ppt/presentation.xml><?xml version="1.0" encoding="utf-8"?>
-<p:presentation xmlns:a="http://schemas.openxmlformats.org/drawingml/2006/main" xmlns:r="http://schemas.openxmlformats.org/officeDocument/2006/relationships" xmlns:p="http://schemas.openxmlformats.org/presentationml/2006/main" compatMode="1" strictFirstAndLastChars="0" saveSubsetFonts="1">
+<p:presentation xmlns:a="http://schemas.openxmlformats.org/drawingml/2006/main" xmlns:r="http://schemas.openxmlformats.org/officeDocument/2006/relationships" xmlns:p="http://schemas.openxmlformats.org/presentationml/2006/main" strictFirstAndLastChars="0" saveSubsetFonts="1">
   <p:sldMasterIdLst>
     <p:sldMasterId id="2147483648" r:id="rId1"/>
   </p:sldMasterIdLst>
@@ -11672,15 +11672,15 @@
               </a:spcBef>
             </a:pPr>
             <a:r>
-              <a:rPr lang="en-GB" sz="2800"/>
+              <a:rPr lang="en-GB" sz="2800" dirty="0"/>
               <a:t>Probability (p) of an </a:t>
             </a:r>
             <a:r>
-              <a:rPr lang="en-GB" sz="2800" i="1" u="sng"/>
+              <a:rPr lang="en-GB" sz="2800" i="1" u="sng" dirty="0"/>
               <a:t>event</a:t>
             </a:r>
             <a:r>
-              <a:rPr lang="en-GB" sz="2800"/>
+              <a:rPr lang="en-GB" sz="2800" dirty="0"/>
               <a:t> occurring defined as value 0-1 – 0 = never occurs, 1 = always occurs</a:t>
             </a:r>
           </a:p>
@@ -11694,7 +11694,7 @@
               </a:spcBef>
             </a:pPr>
             <a:r>
-              <a:rPr lang="en-GB" sz="2800">
+              <a:rPr lang="en-GB" sz="2800" dirty="0">
                 <a:solidFill>
                   <a:srgbClr val="FFFF99"/>
                 </a:solidFill>
@@ -11711,7 +11711,7 @@
                 <a:spcPct val="20000"/>
               </a:spcBef>
             </a:pPr>
-            <a:endParaRPr lang="en-GB" sz="2800">
+            <a:endParaRPr lang="en-GB" sz="2800" dirty="0">
               <a:solidFill>
                 <a:srgbClr val="FFFF99"/>
               </a:solidFill>
@@ -11726,7 +11726,7 @@
                 <a:spcPct val="20000"/>
               </a:spcBef>
             </a:pPr>
-            <a:endParaRPr lang="en-GB" sz="2800">
+            <a:endParaRPr lang="en-GB" sz="2800" dirty="0">
               <a:solidFill>
                 <a:srgbClr val="FFFF99"/>
               </a:solidFill>
@@ -11741,7 +11741,7 @@
                 <a:spcPct val="20000"/>
               </a:spcBef>
             </a:pPr>
-            <a:endParaRPr lang="en-GB" sz="2800">
+            <a:endParaRPr lang="en-GB" sz="2800" dirty="0">
               <a:solidFill>
                 <a:srgbClr val="FFFF99"/>
               </a:solidFill>
@@ -11756,7 +11756,7 @@
                 <a:spcPct val="20000"/>
               </a:spcBef>
             </a:pPr>
-            <a:endParaRPr lang="en-GB" sz="2800">
+            <a:endParaRPr lang="en-GB" sz="2800" dirty="0">
               <a:solidFill>
                 <a:srgbClr val="FFFF99"/>
               </a:solidFill>
@@ -11771,7 +11771,7 @@
                 <a:spcPct val="20000"/>
               </a:spcBef>
             </a:pPr>
-            <a:endParaRPr lang="en-GB" sz="2800">
+            <a:endParaRPr lang="en-GB" sz="2800" dirty="0">
               <a:solidFill>
                 <a:srgbClr val="FFFF99"/>
               </a:solidFill>
@@ -11786,7 +11786,7 @@
                 <a:spcPct val="20000"/>
               </a:spcBef>
             </a:pPr>
-            <a:endParaRPr lang="en-GB" sz="2800">
+            <a:endParaRPr lang="en-GB" sz="2800" dirty="0">
               <a:solidFill>
                 <a:srgbClr val="FFFF99"/>
               </a:solidFill>
@@ -11802,13 +11802,26 @@
               </a:spcBef>
             </a:pPr>
             <a:r>
-              <a:rPr lang="en-GB" sz="2800">
+              <a:rPr lang="en-GB" sz="2800" dirty="0">
                 <a:solidFill>
                   <a:srgbClr val="FFFF00"/>
                 </a:solidFill>
               </a:rPr>
-              <a:t>Probability of throwing a 6 in one die throw = 0.167</a:t>
-            </a:r>
+              <a:t>Probability of throwing a 6 in one die throw = </a:t>
+            </a:r>
+            <a:r>
+              <a:rPr lang="en-GB" sz="2800" dirty="0" smtClean="0">
+                <a:solidFill>
+                  <a:srgbClr val="FFFF00"/>
+                </a:solidFill>
+              </a:rPr>
+              <a:t>0.167.</a:t>
+            </a:r>
+            <a:endParaRPr lang="en-GB" sz="2800" dirty="0">
+              <a:solidFill>
+                <a:srgbClr val="FFFF00"/>
+              </a:solidFill>
+            </a:endParaRPr>
           </a:p>
           <a:p>
             <a:pPr marL="814388" indent="-814388" eaLnBrk="0" hangingPunct="0">
@@ -11820,13 +11833,26 @@
               </a:spcBef>
             </a:pPr>
             <a:r>
-              <a:rPr lang="en-GB" sz="2800">
+              <a:rPr lang="en-GB" sz="2800" dirty="0">
                 <a:solidFill>
                   <a:srgbClr val="FFFF00"/>
                 </a:solidFill>
               </a:rPr>
-              <a:t>Probability of all possible outcomes will sum to 1</a:t>
-            </a:r>
+              <a:t>Probability of all possible outcomes will sum to </a:t>
+            </a:r>
+            <a:r>
+              <a:rPr lang="en-GB" sz="2800" dirty="0" smtClean="0">
+                <a:solidFill>
+                  <a:srgbClr val="FFFF00"/>
+                </a:solidFill>
+              </a:rPr>
+              <a:t>1.</a:t>
+            </a:r>
+            <a:endParaRPr lang="en-GB" sz="2800" dirty="0">
+              <a:solidFill>
+                <a:srgbClr val="FFFF00"/>
+              </a:solidFill>
+            </a:endParaRPr>
           </a:p>
           <a:p>
             <a:pPr marL="814388" indent="-814388" eaLnBrk="0" hangingPunct="0">
@@ -11837,7 +11863,7 @@
                 <a:spcPct val="20000"/>
               </a:spcBef>
             </a:pPr>
-            <a:endParaRPr lang="en-GB" sz="2800">
+            <a:endParaRPr lang="en-GB" sz="2800" dirty="0">
               <a:solidFill>
                 <a:srgbClr val="FFFF99"/>
               </a:solidFill>
@@ -11852,7 +11878,7 @@
                 <a:spcPct val="20000"/>
               </a:spcBef>
             </a:pPr>
-            <a:endParaRPr lang="en-GB" sz="2800">
+            <a:endParaRPr lang="en-GB" sz="2800" dirty="0">
               <a:solidFill>
                 <a:srgbClr val="FFFF99"/>
               </a:solidFill>
@@ -11869,7 +11895,7 @@
               <a:buFontTx/>
               <a:buChar char="-"/>
             </a:pPr>
-            <a:endParaRPr lang="en-GB" sz="2800">
+            <a:endParaRPr lang="en-GB" sz="2800" dirty="0">
               <a:solidFill>
                 <a:srgbClr val="FFFF99"/>
               </a:solidFill>
@@ -11884,7 +11910,7 @@
                 <a:spcPct val="20000"/>
               </a:spcBef>
             </a:pPr>
-            <a:endParaRPr lang="en-GB" sz="2800"/>
+            <a:endParaRPr lang="en-GB" sz="2800" dirty="0"/>
           </a:p>
           <a:p>
             <a:pPr marL="814388" indent="-814388" eaLnBrk="0" hangingPunct="0">
@@ -11895,7 +11921,7 @@
                 <a:spcPct val="20000"/>
               </a:spcBef>
             </a:pPr>
-            <a:endParaRPr lang="en-GB" sz="2800"/>
+            <a:endParaRPr lang="en-GB" sz="2800" dirty="0"/>
           </a:p>
           <a:p>
             <a:pPr marL="814388" indent="-814388" eaLnBrk="0" hangingPunct="0">
@@ -11907,7 +11933,7 @@
               </a:spcBef>
             </a:pPr>
             <a:r>
-              <a:rPr lang="en-GB" sz="2800"/>
+              <a:rPr lang="en-GB" sz="2800" dirty="0"/>
               <a:t>			</a:t>
             </a:r>
           </a:p>
@@ -12539,13 +12565,14 @@
               </a:spcBef>
             </a:pPr>
             <a:r>
-              <a:rPr lang="en-GB" sz="2400"/>
+              <a:rPr lang="en-GB" sz="2400" dirty="0"/>
               <a:t>When we try to determine whether e.g. two variables are related talk in terms of </a:t>
             </a:r>
             <a:r>
-              <a:rPr lang="en-GB" sz="2400" i="1"/>
-              <a:t>probability</a:t>
-            </a:r>
+              <a:rPr lang="en-GB" sz="2400" i="1" dirty="0" smtClean="0"/>
+              <a:t>probability.</a:t>
+            </a:r>
+            <a:endParaRPr lang="en-GB" sz="2400" i="1" dirty="0"/>
           </a:p>
           <a:p>
             <a:pPr marL="1271588" lvl="1" indent="-814388" eaLnBrk="0" hangingPunct="0">
@@ -12557,15 +12584,15 @@
               </a:spcBef>
             </a:pPr>
             <a:r>
-              <a:rPr lang="en-GB" sz="2400">
+              <a:rPr lang="en-GB" sz="2400" dirty="0" smtClean="0">
                 <a:solidFill>
                   <a:srgbClr val="FFFF00"/>
                 </a:solidFill>
               </a:rPr>
-              <a:t>Possible </a:t>
-            </a:r>
-            <a:r>
-              <a:rPr lang="en-GB" sz="2400" i="1">
+              <a:t>It is possible </a:t>
+            </a:r>
+            <a:r>
+              <a:rPr lang="en-GB" sz="2400" i="1" dirty="0">
                 <a:solidFill>
                   <a:srgbClr val="FFFF00"/>
                 </a:solidFill>
@@ -12573,13 +12600,26 @@
               <a:t>any</a:t>
             </a:r>
             <a:r>
-              <a:rPr lang="en-GB" sz="2400">
+              <a:rPr lang="en-GB" sz="2400" dirty="0">
                 <a:solidFill>
                   <a:srgbClr val="FFFF00"/>
                 </a:solidFill>
               </a:rPr>
-              <a:t> apparent relationship is chance</a:t>
-            </a:r>
+              <a:t> apparent relationship is </a:t>
+            </a:r>
+            <a:r>
+              <a:rPr lang="en-GB" sz="2400" dirty="0" smtClean="0">
+                <a:solidFill>
+                  <a:srgbClr val="FFFF00"/>
+                </a:solidFill>
+              </a:rPr>
+              <a:t>chance.</a:t>
+            </a:r>
+            <a:endParaRPr lang="en-GB" sz="2400" dirty="0">
+              <a:solidFill>
+                <a:srgbClr val="FFFF00"/>
+              </a:solidFill>
+            </a:endParaRPr>
           </a:p>
           <a:p>
             <a:pPr marL="1271588" lvl="1" indent="-814388" eaLnBrk="0" hangingPunct="0">
@@ -12591,7 +12631,7 @@
               </a:spcBef>
             </a:pPr>
             <a:r>
-              <a:rPr lang="en-GB" sz="2400">
+              <a:rPr lang="en-GB" sz="2400" dirty="0">
                 <a:solidFill>
                   <a:srgbClr val="FFFF00"/>
                 </a:solidFill>
@@ -12599,7 +12639,7 @@
               <a:t>Try to work out how unlikely this is – as a </a:t>
             </a:r>
             <a:r>
-              <a:rPr lang="en-GB" sz="2400" i="1">
+              <a:rPr lang="en-GB" sz="2400" i="1" dirty="0">
                 <a:solidFill>
                   <a:srgbClr val="FFFF00"/>
                 </a:solidFill>
@@ -12607,13 +12647,26 @@
               <a:t>p</a:t>
             </a:r>
             <a:r>
-              <a:rPr lang="en-GB" sz="2400">
+              <a:rPr lang="en-GB" sz="2400" dirty="0">
                 <a:solidFill>
                   <a:srgbClr val="FFFF00"/>
                 </a:solidFill>
               </a:rPr>
-              <a:t> value</a:t>
-            </a:r>
+              <a:t> </a:t>
+            </a:r>
+            <a:r>
+              <a:rPr lang="en-GB" sz="2400" dirty="0" smtClean="0">
+                <a:solidFill>
+                  <a:srgbClr val="FFFF00"/>
+                </a:solidFill>
+              </a:rPr>
+              <a:t>value.</a:t>
+            </a:r>
+            <a:endParaRPr lang="en-GB" sz="2400" dirty="0">
+              <a:solidFill>
+                <a:srgbClr val="FFFF00"/>
+              </a:solidFill>
+            </a:endParaRPr>
           </a:p>
           <a:p>
             <a:pPr marL="814388" indent="-814388" eaLnBrk="0" hangingPunct="0">
@@ -12625,18 +12678,22 @@
               </a:spcBef>
             </a:pPr>
             <a:r>
-              <a:rPr lang="en-GB" sz="2400"/>
+              <a:rPr lang="en-GB" sz="2400" dirty="0"/>
               <a:t>Also used in </a:t>
             </a:r>
             <a:r>
-              <a:rPr lang="en-GB" sz="2400" i="1"/>
+              <a:rPr lang="en-GB" sz="2400" i="1" dirty="0"/>
               <a:t>probability-distribution</a:t>
             </a:r>
             <a:r>
-              <a:rPr lang="en-GB" sz="2400"/>
-              <a:t> diagrams</a:t>
-            </a:r>
-            <a:endParaRPr lang="en-GB" sz="2400" i="1"/>
+              <a:rPr lang="en-GB" sz="2400" dirty="0"/>
+              <a:t> </a:t>
+            </a:r>
+            <a:r>
+              <a:rPr lang="en-GB" sz="2400" dirty="0" smtClean="0"/>
+              <a:t>diagrams:</a:t>
+            </a:r>
+            <a:endParaRPr lang="en-GB" sz="2400" i="1" dirty="0"/>
           </a:p>
           <a:p>
             <a:pPr marL="1271588" lvl="1" indent="-814388" eaLnBrk="0" hangingPunct="0">
@@ -12647,7 +12704,7 @@
                 <a:spcPct val="20000"/>
               </a:spcBef>
             </a:pPr>
-            <a:endParaRPr lang="en-GB" sz="2400">
+            <a:endParaRPr lang="en-GB" sz="2400" dirty="0">
               <a:solidFill>
                 <a:srgbClr val="FFFF00"/>
               </a:solidFill>
@@ -12662,7 +12719,7 @@
                 <a:spcPct val="20000"/>
               </a:spcBef>
             </a:pPr>
-            <a:endParaRPr lang="en-GB" sz="2400" i="1">
+            <a:endParaRPr lang="en-GB" sz="2400" i="1" dirty="0">
               <a:solidFill>
                 <a:srgbClr val="FFFF00"/>
               </a:solidFill>
@@ -12677,7 +12734,7 @@
                 <a:spcPct val="20000"/>
               </a:spcBef>
             </a:pPr>
-            <a:endParaRPr lang="en-GB" sz="2400">
+            <a:endParaRPr lang="en-GB" sz="2400" dirty="0">
               <a:solidFill>
                 <a:srgbClr val="FFFF99"/>
               </a:solidFill>
@@ -12692,7 +12749,7 @@
                 <a:spcPct val="20000"/>
               </a:spcBef>
             </a:pPr>
-            <a:endParaRPr lang="en-GB" sz="2400">
+            <a:endParaRPr lang="en-GB" sz="2400" dirty="0">
               <a:solidFill>
                 <a:srgbClr val="FFFF99"/>
               </a:solidFill>
@@ -12709,7 +12766,7 @@
               <a:buFontTx/>
               <a:buChar char="-"/>
             </a:pPr>
-            <a:endParaRPr lang="en-GB" sz="2400">
+            <a:endParaRPr lang="en-GB" sz="2400" dirty="0">
               <a:solidFill>
                 <a:srgbClr val="FFFF99"/>
               </a:solidFill>
@@ -12724,7 +12781,7 @@
                 <a:spcPct val="20000"/>
               </a:spcBef>
             </a:pPr>
-            <a:endParaRPr lang="en-GB" sz="2400"/>
+            <a:endParaRPr lang="en-GB" sz="2400" dirty="0"/>
           </a:p>
           <a:p>
             <a:pPr marL="814388" indent="-814388" eaLnBrk="0" hangingPunct="0">
@@ -12735,7 +12792,7 @@
                 <a:spcPct val="20000"/>
               </a:spcBef>
             </a:pPr>
-            <a:endParaRPr lang="en-GB" sz="2400"/>
+            <a:endParaRPr lang="en-GB" sz="2400" dirty="0"/>
           </a:p>
           <a:p>
             <a:pPr marL="814388" indent="-814388" eaLnBrk="0" hangingPunct="0">
@@ -12747,7 +12804,7 @@
               </a:spcBef>
             </a:pPr>
             <a:r>
-              <a:rPr lang="en-GB" sz="2400"/>
+              <a:rPr lang="en-GB" sz="2400" dirty="0"/>
               <a:t>			</a:t>
             </a:r>
           </a:p>
@@ -12860,13 +12917,26 @@
               </a:spcBef>
             </a:pPr>
             <a:r>
-              <a:rPr lang="en-GB" sz="2000">
+              <a:rPr lang="en-GB" sz="2000" dirty="0">
                 <a:solidFill>
                   <a:srgbClr val="FFFF99"/>
                 </a:solidFill>
               </a:rPr>
-              <a:t>Summary of how some variable is distributed</a:t>
-            </a:r>
+              <a:t>Summary of how some variable is </a:t>
+            </a:r>
+            <a:r>
+              <a:rPr lang="en-GB" sz="2000" dirty="0" smtClean="0">
+                <a:solidFill>
+                  <a:srgbClr val="FFFF99"/>
+                </a:solidFill>
+              </a:rPr>
+              <a:t>distributed.</a:t>
+            </a:r>
+            <a:endParaRPr lang="en-GB" sz="2000" dirty="0">
+              <a:solidFill>
+                <a:srgbClr val="FFFF99"/>
+              </a:solidFill>
+            </a:endParaRPr>
           </a:p>
           <a:p>
             <a:pPr marL="180975" indent="-180975" eaLnBrk="0" hangingPunct="0">
@@ -12878,13 +12948,26 @@
               </a:spcBef>
             </a:pPr>
             <a:r>
-              <a:rPr lang="en-GB" sz="2000">
+              <a:rPr lang="en-GB" sz="2000" dirty="0">
                 <a:solidFill>
                   <a:srgbClr val="FFFF99"/>
                 </a:solidFill>
               </a:rPr>
-              <a:t>Y axis ‘probability of sampling’</a:t>
-            </a:r>
+              <a:t>Y axis ‘probability of sampling</a:t>
+            </a:r>
+            <a:r>
+              <a:rPr lang="en-GB" sz="2000" dirty="0" smtClean="0">
+                <a:solidFill>
+                  <a:srgbClr val="FFFF99"/>
+                </a:solidFill>
+              </a:rPr>
+              <a:t>’.</a:t>
+            </a:r>
+            <a:endParaRPr lang="en-GB" sz="2000" dirty="0">
+              <a:solidFill>
+                <a:srgbClr val="FFFF99"/>
+              </a:solidFill>
+            </a:endParaRPr>
           </a:p>
           <a:p>
             <a:pPr marL="180975" indent="-180975" eaLnBrk="0" hangingPunct="0">
@@ -12896,7 +12979,7 @@
               </a:spcBef>
             </a:pPr>
             <a:r>
-              <a:rPr lang="en-GB" sz="2000">
+              <a:rPr lang="en-GB" sz="2000" dirty="0">
                 <a:solidFill>
                   <a:srgbClr val="FFFF99"/>
                 </a:solidFill>
@@ -12904,7 +12987,7 @@
               <a:t>Can’t talk about probability of getting a particular value </a:t>
             </a:r>
             <a:r>
-              <a:rPr lang="en-GB" sz="2000">
+              <a:rPr lang="en-GB" sz="2000" dirty="0">
                 <a:solidFill>
                   <a:srgbClr val="FFC000"/>
                 </a:solidFill>
@@ -12912,7 +12995,7 @@
               <a:t>(why not?</a:t>
             </a:r>
             <a:r>
-              <a:rPr lang="en-GB" sz="2000">
+              <a:rPr lang="en-GB" sz="2000" dirty="0">
                 <a:solidFill>
                   <a:srgbClr val="FFFF99"/>
                 </a:solidFill>
@@ -12930,7 +13013,7 @@
               </a:spcBef>
             </a:pPr>
             <a:r>
-              <a:rPr lang="en-GB" sz="2000">
+              <a:rPr lang="en-GB" sz="2000" dirty="0">
                 <a:solidFill>
                   <a:srgbClr val="FFFF99"/>
                 </a:solidFill>
@@ -12948,7 +13031,7 @@
               </a:spcBef>
             </a:pPr>
             <a:r>
-              <a:rPr lang="en-GB" sz="2000">
+              <a:rPr lang="en-GB" sz="2000" dirty="0">
                 <a:solidFill>
                   <a:srgbClr val="FFFF99"/>
                 </a:solidFill>
@@ -14051,7 +14134,15 @@
                 <a:ea typeface="+mn-ea"/>
                 <a:cs typeface="+mn-cs"/>
               </a:rPr>
-              <a:t>Histograms of samples are ways of getting at underlying probability distributions of populations</a:t>
+              <a:t>Histograms of samples are ways of getting at underlying probability distributions of </a:t>
+            </a:r>
+            <a:r>
+              <a:rPr lang="en-GB" sz="2400" dirty="0" smtClean="0">
+                <a:latin typeface="Arial" pitchFamily="34" charset="0"/>
+                <a:ea typeface="+mn-ea"/>
+                <a:cs typeface="+mn-cs"/>
+              </a:rPr>
+              <a:t>populations.</a:t>
             </a:r>
             <a:endParaRPr lang="en-GB" sz="2400" i="1" dirty="0">
               <a:latin typeface="Arial" pitchFamily="34" charset="0"/>
@@ -16681,9 +16772,14 @@
               </a:spcBef>
             </a:pPr>
             <a:r>
-              <a:rPr lang="en-GB" sz="2400"/>
-              <a:t>Normal distributions are important as a lot of inferential statistical methods assume distributions are normal</a:t>
-            </a:r>
+              <a:rPr lang="en-GB" sz="2400" dirty="0"/>
+              <a:t>Normal distributions are important as a lot of inferential statistical methods assume distributions are </a:t>
+            </a:r>
+            <a:r>
+              <a:rPr lang="en-GB" sz="2400" dirty="0" smtClean="0"/>
+              <a:t>normal.</a:t>
+            </a:r>
+            <a:endParaRPr lang="en-GB" sz="2400" dirty="0"/>
           </a:p>
           <a:p>
             <a:pPr marL="814388" indent="-814388" eaLnBrk="0" hangingPunct="0">
@@ -16695,9 +16791,14 @@
               </a:spcBef>
             </a:pPr>
             <a:r>
-              <a:rPr lang="en-GB" sz="2400"/>
-              <a:t>No real-world distribution is completely normal</a:t>
-            </a:r>
+              <a:rPr lang="en-GB" sz="2400" dirty="0"/>
+              <a:t>No real-world distribution is completely </a:t>
+            </a:r>
+            <a:r>
+              <a:rPr lang="en-GB" sz="2400" dirty="0" smtClean="0"/>
+              <a:t>normal.</a:t>
+            </a:r>
+            <a:endParaRPr lang="en-GB" sz="2400" dirty="0"/>
           </a:p>
           <a:p>
             <a:pPr marL="814388" indent="-814388" eaLnBrk="0" hangingPunct="0">
@@ -16709,7 +16810,7 @@
               </a:spcBef>
             </a:pPr>
             <a:r>
-              <a:rPr lang="en-GB" sz="2400"/>
+              <a:rPr lang="en-GB" sz="2400" dirty="0"/>
               <a:t>Many people assume deviations from normal are minor – this can be problematic!</a:t>
             </a:r>
           </a:p>
@@ -16722,7 +16823,7 @@
                 <a:spcPct val="20000"/>
               </a:spcBef>
             </a:pPr>
-            <a:endParaRPr lang="en-GB" sz="2400">
+            <a:endParaRPr lang="en-GB" sz="2400" dirty="0">
               <a:solidFill>
                 <a:srgbClr val="FFFF00"/>
               </a:solidFill>
@@ -16737,7 +16838,7 @@
                 <a:spcPct val="20000"/>
               </a:spcBef>
             </a:pPr>
-            <a:endParaRPr lang="en-GB" sz="2400" i="1">
+            <a:endParaRPr lang="en-GB" sz="2400" i="1" dirty="0">
               <a:solidFill>
                 <a:srgbClr val="FFFF00"/>
               </a:solidFill>
@@ -16752,7 +16853,7 @@
                 <a:spcPct val="20000"/>
               </a:spcBef>
             </a:pPr>
-            <a:endParaRPr lang="en-GB" sz="2400">
+            <a:endParaRPr lang="en-GB" sz="2400" dirty="0">
               <a:solidFill>
                 <a:srgbClr val="FFFF99"/>
               </a:solidFill>
@@ -16767,7 +16868,7 @@
                 <a:spcPct val="20000"/>
               </a:spcBef>
             </a:pPr>
-            <a:endParaRPr lang="en-GB" sz="2400">
+            <a:endParaRPr lang="en-GB" sz="2400" dirty="0">
               <a:solidFill>
                 <a:srgbClr val="FFFF99"/>
               </a:solidFill>
@@ -16784,7 +16885,7 @@
               <a:buFontTx/>
               <a:buChar char="-"/>
             </a:pPr>
-            <a:endParaRPr lang="en-GB" sz="2400">
+            <a:endParaRPr lang="en-GB" sz="2400" dirty="0">
               <a:solidFill>
                 <a:srgbClr val="FFFF99"/>
               </a:solidFill>
@@ -16799,7 +16900,7 @@
                 <a:spcPct val="20000"/>
               </a:spcBef>
             </a:pPr>
-            <a:endParaRPr lang="en-GB" sz="2400"/>
+            <a:endParaRPr lang="en-GB" sz="2400" dirty="0"/>
           </a:p>
           <a:p>
             <a:pPr marL="814388" indent="-814388" eaLnBrk="0" hangingPunct="0">
@@ -16810,7 +16911,7 @@
                 <a:spcPct val="20000"/>
               </a:spcBef>
             </a:pPr>
-            <a:endParaRPr lang="en-GB" sz="2400"/>
+            <a:endParaRPr lang="en-GB" sz="2400" dirty="0"/>
           </a:p>
           <a:p>
             <a:pPr marL="814388" indent="-814388" eaLnBrk="0" hangingPunct="0">
@@ -16822,7 +16923,7 @@
               </a:spcBef>
             </a:pPr>
             <a:r>
-              <a:rPr lang="en-GB" sz="2400"/>
+              <a:rPr lang="en-GB" sz="2400" dirty="0"/>
               <a:t>			</a:t>
             </a:r>
           </a:p>
@@ -16987,13 +17088,26 @@
               </a:spcBef>
             </a:pPr>
             <a:r>
-              <a:rPr lang="en-GB" sz="2400">
+              <a:rPr lang="en-GB" sz="2400" dirty="0">
                 <a:solidFill>
                   <a:srgbClr val="FFFF99"/>
                 </a:solidFill>
               </a:rPr>
-              <a:t>Histogram of 2000 overall module marks from ESESIS</a:t>
-            </a:r>
+              <a:t>Histogram of 2000 overall module marks from </a:t>
+            </a:r>
+            <a:r>
+              <a:rPr lang="en-GB" sz="2400" dirty="0" smtClean="0">
+                <a:solidFill>
+                  <a:srgbClr val="FFFF99"/>
+                </a:solidFill>
+              </a:rPr>
+              <a:t>ESESIS.</a:t>
+            </a:r>
+            <a:endParaRPr lang="en-GB" sz="2400" dirty="0">
+              <a:solidFill>
+                <a:srgbClr val="FFFF99"/>
+              </a:solidFill>
+            </a:endParaRPr>
           </a:p>
           <a:p>
             <a:pPr marL="265113" indent="-265113" eaLnBrk="0" hangingPunct="0">
@@ -17005,7 +17119,7 @@
               </a:spcBef>
             </a:pPr>
             <a:r>
-              <a:rPr lang="en-GB" sz="2400">
+              <a:rPr lang="en-GB" sz="2400" dirty="0">
                 <a:solidFill>
                   <a:srgbClr val="FFFF99"/>
                 </a:solidFill>
@@ -17023,13 +17137,26 @@
               </a:spcBef>
             </a:pPr>
             <a:r>
-              <a:rPr lang="en-GB" sz="2400">
+              <a:rPr lang="en-GB" sz="2400" dirty="0">
                 <a:solidFill>
                   <a:srgbClr val="FFFF99"/>
                 </a:solidFill>
               </a:rPr>
-              <a:t>Sort of – but</a:t>
-            </a:r>
+              <a:t>Sort </a:t>
+            </a:r>
+            <a:r>
+              <a:rPr lang="en-GB" sz="2400" dirty="0" smtClean="0">
+                <a:solidFill>
+                  <a:srgbClr val="FFFF99"/>
+                </a:solidFill>
+              </a:rPr>
+              <a:t>of…but:</a:t>
+            </a:r>
+            <a:endParaRPr lang="en-GB" sz="2400" dirty="0">
+              <a:solidFill>
+                <a:srgbClr val="FFFF99"/>
+              </a:solidFill>
+            </a:endParaRPr>
           </a:p>
           <a:p>
             <a:pPr marL="265113" indent="-265113" eaLnBrk="0" hangingPunct="0">
@@ -17041,13 +17168,42 @@
               </a:spcBef>
             </a:pPr>
             <a:r>
-              <a:rPr lang="en-GB" sz="2400">
+              <a:rPr lang="en-GB" sz="2400" dirty="0">
                 <a:solidFill>
                   <a:srgbClr val="FFFF00"/>
                 </a:solidFill>
               </a:rPr>
-              <a:t>	- big peak around 60</a:t>
-            </a:r>
+              <a:t>	</a:t>
+            </a:r>
+            <a:r>
+              <a:rPr lang="en-GB" sz="2400" dirty="0" smtClean="0">
+                <a:solidFill>
+                  <a:srgbClr val="FFFF00"/>
+                </a:solidFill>
+              </a:rPr>
+              <a:t>Big </a:t>
+            </a:r>
+            <a:r>
+              <a:rPr lang="en-GB" sz="2400" dirty="0">
+                <a:solidFill>
+                  <a:srgbClr val="FFFF00"/>
+                </a:solidFill>
+              </a:rPr>
+              <a:t>peak around </a:t>
+            </a:r>
+            <a:r>
+              <a:rPr lang="en-GB" sz="2400" dirty="0" smtClean="0">
+                <a:solidFill>
+                  <a:srgbClr val="FFFF00"/>
+                </a:solidFill>
+              </a:rPr>
+              <a:t>60.</a:t>
+            </a:r>
+            <a:endParaRPr lang="en-GB" sz="2400" dirty="0">
+              <a:solidFill>
+                <a:srgbClr val="FFFF00"/>
+              </a:solidFill>
+            </a:endParaRPr>
           </a:p>
           <a:p>
             <a:pPr marL="265113" indent="-265113" eaLnBrk="0" hangingPunct="0">
@@ -17059,13 +17215,42 @@
               </a:spcBef>
             </a:pPr>
             <a:r>
-              <a:rPr lang="en-GB" sz="2400">
+              <a:rPr lang="en-GB" sz="2400" dirty="0">
                 <a:solidFill>
                   <a:srgbClr val="FFFF00"/>
                 </a:solidFill>
               </a:rPr>
-              <a:t>	- skewed – long left tail</a:t>
-            </a:r>
+              <a:t>	</a:t>
+            </a:r>
+            <a:r>
+              <a:rPr lang="en-GB" sz="2400" dirty="0" smtClean="0">
+                <a:solidFill>
+                  <a:srgbClr val="FFFF00"/>
+                </a:solidFill>
+              </a:rPr>
+              <a:t>Skewed </a:t>
+            </a:r>
+            <a:r>
+              <a:rPr lang="en-GB" sz="2400" dirty="0">
+                <a:solidFill>
+                  <a:srgbClr val="FFFF00"/>
+                </a:solidFill>
+              </a:rPr>
+              <a:t>– long left </a:t>
+            </a:r>
+            <a:r>
+              <a:rPr lang="en-GB" sz="2400" dirty="0" smtClean="0">
+                <a:solidFill>
+                  <a:srgbClr val="FFFF00"/>
+                </a:solidFill>
+              </a:rPr>
+              <a:t>tail.</a:t>
+            </a:r>
+            <a:endParaRPr lang="en-GB" sz="2400" dirty="0">
+              <a:solidFill>
+                <a:srgbClr val="FFFF00"/>
+              </a:solidFill>
+            </a:endParaRPr>
           </a:p>
           <a:p>
             <a:pPr marL="265113" indent="-265113" eaLnBrk="0" hangingPunct="0">
@@ -17076,7 +17261,7 @@
                 <a:spcPct val="20000"/>
               </a:spcBef>
             </a:pPr>
-            <a:endParaRPr lang="en-GB" sz="2400" i="1">
+            <a:endParaRPr lang="en-GB" sz="2400" i="1" dirty="0">
               <a:solidFill>
                 <a:srgbClr val="FFFF00"/>
               </a:solidFill>
@@ -17091,7 +17276,7 @@
                 <a:spcPct val="20000"/>
               </a:spcBef>
             </a:pPr>
-            <a:endParaRPr lang="en-GB" sz="2400">
+            <a:endParaRPr lang="en-GB" sz="2400" dirty="0">
               <a:solidFill>
                 <a:srgbClr val="FFFF99"/>
               </a:solidFill>
@@ -17106,7 +17291,7 @@
                 <a:spcPct val="20000"/>
               </a:spcBef>
             </a:pPr>
-            <a:endParaRPr lang="en-GB" sz="2400">
+            <a:endParaRPr lang="en-GB" sz="2400" dirty="0">
               <a:solidFill>
                 <a:srgbClr val="FFFF99"/>
               </a:solidFill>
@@ -17123,7 +17308,7 @@
               <a:buFontTx/>
               <a:buChar char="-"/>
             </a:pPr>
-            <a:endParaRPr lang="en-GB" sz="2400">
+            <a:endParaRPr lang="en-GB" sz="2400" dirty="0">
               <a:solidFill>
                 <a:srgbClr val="FFFF99"/>
               </a:solidFill>
@@ -17138,7 +17323,7 @@
                 <a:spcPct val="20000"/>
               </a:spcBef>
             </a:pPr>
-            <a:endParaRPr lang="en-GB" sz="2400"/>
+            <a:endParaRPr lang="en-GB" sz="2400" dirty="0"/>
           </a:p>
           <a:p>
             <a:pPr marL="265113" indent="-265113" eaLnBrk="0" hangingPunct="0">
@@ -17149,7 +17334,7 @@
                 <a:spcPct val="20000"/>
               </a:spcBef>
             </a:pPr>
-            <a:endParaRPr lang="en-GB" sz="2400"/>
+            <a:endParaRPr lang="en-GB" sz="2400" dirty="0"/>
           </a:p>
           <a:p>
             <a:pPr marL="265113" indent="-265113" eaLnBrk="0" hangingPunct="0">
@@ -17161,7 +17346,7 @@
               </a:spcBef>
             </a:pPr>
             <a:r>
-              <a:rPr lang="en-GB" sz="2400"/>
+              <a:rPr lang="en-GB" sz="2400" dirty="0"/>
               <a:t>			</a:t>
             </a:r>
           </a:p>
@@ -17966,13 +18151,26 @@
               </a:spcBef>
             </a:pPr>
             <a:r>
-              <a:rPr lang="en-GB" sz="2800">
+              <a:rPr lang="en-GB" sz="2800" dirty="0">
                 <a:solidFill>
                   <a:srgbClr val="F2F2F2"/>
                 </a:solidFill>
               </a:rPr>
-              <a:t>Pearson Product-moment Correlation Coefficient</a:t>
-            </a:r>
+              <a:t>Pearson Product-moment Correlation </a:t>
+            </a:r>
+            <a:r>
+              <a:rPr lang="en-GB" sz="2800" dirty="0" smtClean="0">
+                <a:solidFill>
+                  <a:srgbClr val="F2F2F2"/>
+                </a:solidFill>
+              </a:rPr>
+              <a:t>Coefficient.</a:t>
+            </a:r>
+            <a:endParaRPr lang="en-GB" sz="2800" dirty="0">
+              <a:solidFill>
+                <a:srgbClr val="F2F2F2"/>
+              </a:solidFill>
+            </a:endParaRPr>
           </a:p>
           <a:p>
             <a:pPr marL="446088" indent="-446088" eaLnBrk="0" hangingPunct="0">
@@ -17986,13 +18184,42 @@
               <a:buChar char="-"/>
             </a:pPr>
             <a:r>
-              <a:rPr lang="en-GB" sz="2800">
+              <a:rPr lang="en-GB" sz="2800" dirty="0">
                 <a:solidFill>
                   <a:srgbClr val="FFFF99"/>
                 </a:solidFill>
               </a:rPr>
-              <a:t>The most widely used method to get an r-value for correlation</a:t>
-            </a:r>
+              <a:t>The most widely used method to get an </a:t>
+            </a:r>
+            <a:r>
+              <a:rPr lang="en-GB" sz="2800" dirty="0" err="1">
+                <a:solidFill>
+                  <a:srgbClr val="FFFF99"/>
+                </a:solidFill>
+              </a:rPr>
+              <a:t>r-value</a:t>
+            </a:r>
+            <a:r>
+              <a:rPr lang="en-GB" sz="2800" dirty="0">
+                <a:solidFill>
+                  <a:srgbClr val="FFFF99"/>
+                </a:solidFill>
+              </a:rPr>
+              <a:t> for </a:t>
+            </a:r>
+            <a:r>
+              <a:rPr lang="en-GB" sz="2800" dirty="0" smtClean="0">
+                <a:solidFill>
+                  <a:srgbClr val="FFFF99"/>
+                </a:solidFill>
+              </a:rPr>
+              <a:t>correlation.</a:t>
+            </a:r>
+            <a:endParaRPr lang="en-GB" sz="2800" dirty="0">
+              <a:solidFill>
+                <a:srgbClr val="FFFF99"/>
+              </a:solidFill>
+            </a:endParaRPr>
           </a:p>
           <a:p>
             <a:pPr marL="446088" indent="-446088" eaLnBrk="0" hangingPunct="0">
@@ -18006,13 +18233,34 @@
               <a:buChar char="-"/>
             </a:pPr>
             <a:r>
-              <a:rPr lang="en-GB" sz="2800">
+              <a:rPr lang="en-GB" sz="2800" dirty="0" smtClean="0">
                 <a:solidFill>
                   <a:srgbClr val="FFFF99"/>
                 </a:solidFill>
               </a:rPr>
-              <a:t>Won’t go into the maths involved</a:t>
-            </a:r>
+              <a:t>Will not </a:t>
+            </a:r>
+            <a:r>
+              <a:rPr lang="en-GB" sz="2800" dirty="0">
+                <a:solidFill>
+                  <a:srgbClr val="FFFF99"/>
+                </a:solidFill>
+              </a:rPr>
+              <a:t>go into the maths </a:t>
+            </a:r>
+            <a:r>
+              <a:rPr lang="en-GB" sz="2800" dirty="0" smtClean="0">
+                <a:solidFill>
+                  <a:srgbClr val="FFFF99"/>
+                </a:solidFill>
+              </a:rPr>
+              <a:t>involved.</a:t>
+            </a:r>
+            <a:endParaRPr lang="en-GB" sz="2800" dirty="0">
+              <a:solidFill>
+                <a:srgbClr val="FFFF99"/>
+              </a:solidFill>
+            </a:endParaRPr>
           </a:p>
           <a:p>
             <a:pPr marL="446088" indent="-446088" eaLnBrk="0" hangingPunct="0">
@@ -18026,13 +18274,26 @@
               <a:buChar char="-"/>
             </a:pPr>
             <a:r>
-              <a:rPr lang="en-GB" sz="2800">
+              <a:rPr lang="en-GB" sz="2800" dirty="0">
                 <a:solidFill>
                   <a:srgbClr val="FFFF99"/>
                 </a:solidFill>
               </a:rPr>
-              <a:t>Main catch – assumes distributions are Normal</a:t>
-            </a:r>
+              <a:t>Main catch – assumes distributions are </a:t>
+            </a:r>
+            <a:r>
+              <a:rPr lang="en-GB" sz="2800" dirty="0" smtClean="0">
+                <a:solidFill>
+                  <a:srgbClr val="FFFF99"/>
+                </a:solidFill>
+              </a:rPr>
+              <a:t>normal.</a:t>
+            </a:r>
+            <a:endParaRPr lang="en-GB" sz="2800" dirty="0">
+              <a:solidFill>
+                <a:srgbClr val="FFFF99"/>
+              </a:solidFill>
+            </a:endParaRPr>
           </a:p>
           <a:p>
             <a:pPr marL="446088" indent="-446088" eaLnBrk="0" hangingPunct="0">
@@ -18046,7 +18307,7 @@
               <a:buChar char="-"/>
             </a:pPr>
             <a:r>
-              <a:rPr lang="en-GB" sz="2800">
+              <a:rPr lang="en-GB" sz="2800" dirty="0">
                 <a:solidFill>
                   <a:srgbClr val="FFFF99"/>
                 </a:solidFill>
@@ -18064,13 +18325,58 @@
               </a:spcBef>
             </a:pPr>
             <a:r>
-              <a:rPr lang="en-GB" sz="2400">
+              <a:rPr lang="en-GB" sz="2400" dirty="0">
                 <a:solidFill>
                   <a:srgbClr val="F2F2F2"/>
                 </a:solidFill>
               </a:rPr>
-              <a:t>Can calculate a probability value for a Pearson r-value (scipy.stats.pearsonr does this automatically)</a:t>
-            </a:r>
+              <a:t>Can calculate a probability value for a Pearson </a:t>
+            </a:r>
+            <a:r>
+              <a:rPr lang="en-GB" sz="2400" dirty="0" err="1">
+                <a:solidFill>
+                  <a:srgbClr val="F2F2F2"/>
+                </a:solidFill>
+              </a:rPr>
+              <a:t>r-value</a:t>
+            </a:r>
+            <a:r>
+              <a:rPr lang="en-GB" sz="2400" dirty="0">
+                <a:solidFill>
+                  <a:srgbClr val="F2F2F2"/>
+                </a:solidFill>
+              </a:rPr>
+              <a:t> (</a:t>
+            </a:r>
+            <a:r>
+              <a:rPr lang="en-GB" sz="2400" dirty="0" err="1">
+                <a:solidFill>
+                  <a:srgbClr val="F2F2F2"/>
+                </a:solidFill>
+              </a:rPr>
+              <a:t>scipy.stats.pearsonr</a:t>
+            </a:r>
+            <a:r>
+              <a:rPr lang="en-GB" sz="2400" dirty="0">
+                <a:solidFill>
+                  <a:srgbClr val="F2F2F2"/>
+                </a:solidFill>
+              </a:rPr>
+              <a:t> does this automatically</a:t>
+            </a:r>
+            <a:r>
+              <a:rPr lang="en-GB" sz="2400" dirty="0" smtClean="0">
+                <a:solidFill>
+                  <a:srgbClr val="F2F2F2"/>
+                </a:solidFill>
+              </a:rPr>
+              <a:t>).</a:t>
+            </a:r>
+            <a:endParaRPr lang="en-GB" sz="2400" dirty="0">
+              <a:solidFill>
+                <a:srgbClr val="F2F2F2"/>
+              </a:solidFill>
+            </a:endParaRPr>
           </a:p>
           <a:p>
             <a:pPr marL="446088" indent="-446088" eaLnBrk="0" hangingPunct="0">
@@ -18082,13 +18388,26 @@
               </a:spcBef>
             </a:pPr>
             <a:r>
-              <a:rPr lang="en-GB" sz="2400">
+              <a:rPr lang="en-GB" sz="2400" dirty="0">
                 <a:solidFill>
                   <a:srgbClr val="F2F2F2"/>
                 </a:solidFill>
               </a:rPr>
-              <a:t>Gives probability of the apparent correlation coming about by chance</a:t>
-            </a:r>
+              <a:t>Gives probability of the apparent correlation coming about by </a:t>
+            </a:r>
+            <a:r>
+              <a:rPr lang="en-GB" sz="2400" dirty="0" smtClean="0">
+                <a:solidFill>
+                  <a:srgbClr val="F2F2F2"/>
+                </a:solidFill>
+              </a:rPr>
+              <a:t>chance.</a:t>
+            </a:r>
+            <a:endParaRPr lang="en-GB" sz="2400" dirty="0">
+              <a:solidFill>
+                <a:srgbClr val="F2F2F2"/>
+              </a:solidFill>
+            </a:endParaRPr>
           </a:p>
           <a:p>
             <a:pPr marL="446088" indent="-446088" eaLnBrk="0" hangingPunct="0">
@@ -18100,14 +18419,22 @@
               </a:spcBef>
             </a:pPr>
             <a:r>
-              <a:rPr lang="en-GB" sz="2400">
+              <a:rPr lang="en-GB" sz="2400" dirty="0">
                 <a:solidFill>
                   <a:srgbClr val="F2F2F2"/>
                 </a:solidFill>
               </a:rPr>
-              <a:t>Very useful – but assumption of normality remains a problem</a:t>
-            </a:r>
-            <a:endParaRPr lang="en-GB" sz="2800">
+              <a:t>Very useful – but assumption of normality remains a </a:t>
+            </a:r>
+            <a:r>
+              <a:rPr lang="en-GB" sz="2400" dirty="0" smtClean="0">
+                <a:solidFill>
+                  <a:srgbClr val="F2F2F2"/>
+                </a:solidFill>
+              </a:rPr>
+              <a:t>problem.</a:t>
+            </a:r>
+            <a:endParaRPr lang="en-GB" sz="2800" dirty="0">
               <a:solidFill>
                 <a:srgbClr val="F2F2F2"/>
               </a:solidFill>
@@ -18122,7 +18449,7 @@
                 <a:spcPct val="20000"/>
               </a:spcBef>
             </a:pPr>
-            <a:endParaRPr lang="en-GB" sz="2800">
+            <a:endParaRPr lang="en-GB" sz="2800" dirty="0">
               <a:solidFill>
                 <a:srgbClr val="FFFF99"/>
               </a:solidFill>
@@ -18139,7 +18466,7 @@
               <a:buFontTx/>
               <a:buChar char="-"/>
             </a:pPr>
-            <a:endParaRPr lang="en-GB" sz="2800">
+            <a:endParaRPr lang="en-GB" sz="2800" dirty="0">
               <a:solidFill>
                 <a:srgbClr val="FFFF99"/>
               </a:solidFill>
@@ -18154,7 +18481,7 @@
                 <a:spcPct val="20000"/>
               </a:spcBef>
             </a:pPr>
-            <a:endParaRPr lang="en-GB" sz="2800"/>
+            <a:endParaRPr lang="en-GB" sz="2800" dirty="0"/>
           </a:p>
           <a:p>
             <a:pPr marL="446088" indent="-446088" eaLnBrk="0" hangingPunct="0">
@@ -18165,7 +18492,7 @@
                 <a:spcPct val="20000"/>
               </a:spcBef>
             </a:pPr>
-            <a:endParaRPr lang="en-GB" sz="2800"/>
+            <a:endParaRPr lang="en-GB" sz="2800" dirty="0"/>
           </a:p>
           <a:p>
             <a:pPr marL="446088" indent="-446088" eaLnBrk="0" hangingPunct="0">
@@ -18177,7 +18504,7 @@
               </a:spcBef>
             </a:pPr>
             <a:r>
-              <a:rPr lang="en-GB" sz="2800"/>
+              <a:rPr lang="en-GB" sz="2800" dirty="0"/>
               <a:t>			</a:t>
             </a:r>
           </a:p>
@@ -18964,13 +19291,26 @@
               </a:spcBef>
             </a:pPr>
             <a:r>
-              <a:rPr lang="en-GB" sz="2800">
+              <a:rPr lang="en-GB" sz="2800" dirty="0">
                 <a:solidFill>
                   <a:srgbClr val="F2F2F2"/>
                 </a:solidFill>
               </a:rPr>
-              <a:t>Alternative method for correlation is Spearman’s Rank Correlation Coefficient</a:t>
-            </a:r>
+              <a:t>Alternative method for correlation is Spearman’s Rank Correlation </a:t>
+            </a:r>
+            <a:r>
+              <a:rPr lang="en-GB" sz="2800" dirty="0" smtClean="0">
+                <a:solidFill>
+                  <a:srgbClr val="F2F2F2"/>
+                </a:solidFill>
+              </a:rPr>
+              <a:t>Coefficient.</a:t>
+            </a:r>
+            <a:endParaRPr lang="en-GB" sz="2800" dirty="0">
+              <a:solidFill>
+                <a:srgbClr val="F2F2F2"/>
+              </a:solidFill>
+            </a:endParaRPr>
           </a:p>
           <a:p>
             <a:pPr marL="446088" indent="-446088" eaLnBrk="0" hangingPunct="0">
@@ -18982,7 +19322,7 @@
               </a:spcBef>
             </a:pPr>
             <a:r>
-              <a:rPr lang="en-GB" sz="2800">
+              <a:rPr lang="en-GB" sz="2800" dirty="0">
                 <a:solidFill>
                   <a:srgbClr val="F2F2F2"/>
                 </a:solidFill>
@@ -18990,7 +19330,7 @@
               <a:t>This is a </a:t>
             </a:r>
             <a:r>
-              <a:rPr lang="en-GB" sz="2800" i="1">
+              <a:rPr lang="en-GB" sz="2800" i="1" dirty="0">
                 <a:solidFill>
                   <a:srgbClr val="F2F2F2"/>
                 </a:solidFill>
@@ -18998,13 +19338,18 @@
               <a:t>non-parametric </a:t>
             </a:r>
             <a:r>
-              <a:rPr lang="en-GB" sz="2800">
+              <a:rPr lang="en-GB" sz="2800" dirty="0" smtClean="0">
                 <a:solidFill>
                   <a:srgbClr val="F2F2F2"/>
                 </a:solidFill>
               </a:rPr>
-              <a:t>statistic</a:t>
-            </a:r>
+              <a:t>statistic:</a:t>
+            </a:r>
+            <a:endParaRPr lang="en-GB" sz="2800" dirty="0">
+              <a:solidFill>
+                <a:srgbClr val="F2F2F2"/>
+              </a:solidFill>
+            </a:endParaRPr>
           </a:p>
           <a:p>
             <a:pPr marL="446088" indent="-446088" eaLnBrk="0" hangingPunct="0">
@@ -19018,13 +19363,34 @@
               <a:buChar char="•"/>
             </a:pPr>
             <a:r>
-              <a:rPr lang="en-GB" sz="2800">
+              <a:rPr lang="en-GB" sz="2800" dirty="0" smtClean="0">
                 <a:solidFill>
                   <a:srgbClr val="FFFF99"/>
                 </a:solidFill>
               </a:rPr>
-              <a:t>	Does not rely on underlying data being of any 		particular distribution</a:t>
-            </a:r>
+              <a:t>Does </a:t>
+            </a:r>
+            <a:r>
+              <a:rPr lang="en-GB" sz="2800" dirty="0">
+                <a:solidFill>
+                  <a:srgbClr val="FFFF99"/>
+                </a:solidFill>
+              </a:rPr>
+              <a:t>not rely on underlying data being of </a:t>
+            </a:r>
+            <a:r>
+              <a:rPr lang="en-GB" sz="2800" dirty="0" smtClean="0">
+                <a:solidFill>
+                  <a:srgbClr val="FFFF99"/>
+                </a:solidFill>
+              </a:rPr>
+              <a:t>any particular distribution.</a:t>
+            </a:r>
+            <a:endParaRPr lang="en-GB" sz="2800" dirty="0">
+              <a:solidFill>
+                <a:srgbClr val="FFFF99"/>
+              </a:solidFill>
+            </a:endParaRPr>
           </a:p>
           <a:p>
             <a:pPr marL="446088" indent="-446088" eaLnBrk="0" hangingPunct="0">
@@ -19038,15 +19404,15 @@
               <a:buChar char="•"/>
             </a:pPr>
             <a:r>
-              <a:rPr lang="en-GB" sz="2800">
+              <a:rPr lang="en-GB" sz="2800" dirty="0" smtClean="0">
                 <a:solidFill>
                   <a:srgbClr val="FFFF99"/>
                 </a:solidFill>
               </a:rPr>
-              <a:t>	Most </a:t>
-            </a:r>
-            <a:r>
-              <a:rPr lang="en-GB" sz="2800" i="1">
+              <a:t>Most </a:t>
+            </a:r>
+            <a:r>
+              <a:rPr lang="en-GB" sz="2800" i="1" dirty="0">
                 <a:solidFill>
                   <a:srgbClr val="FFFF99"/>
                 </a:solidFill>
@@ -19054,15 +19420,23 @@
               <a:t>non-parametric </a:t>
             </a:r>
             <a:r>
-              <a:rPr lang="en-GB" sz="2800">
+              <a:rPr lang="en-GB" sz="2800" dirty="0">
                 <a:solidFill>
                   <a:srgbClr val="FFFF99"/>
                 </a:solidFill>
               </a:rPr>
-              <a:t>statistics use concept of 		</a:t>
-            </a:r>
-            <a:r>
-              <a:rPr lang="en-GB" sz="2800" i="1">
+              <a:t>statistics use concept </a:t>
+            </a:r>
+            <a:r>
+              <a:rPr lang="en-GB" sz="2800" dirty="0" smtClean="0">
+                <a:solidFill>
+                  <a:srgbClr val="FFFF99"/>
+                </a:solidFill>
+              </a:rPr>
+              <a:t>of </a:t>
+            </a:r>
+            <a:r>
+              <a:rPr lang="en-GB" sz="2800" i="1" dirty="0" smtClean="0">
                 <a:solidFill>
                   <a:srgbClr val="FFFF99"/>
                 </a:solidFill>
@@ -19070,12 +19444,92 @@
               <a:t>ranked</a:t>
             </a:r>
             <a:r>
-              <a:rPr lang="en-GB" sz="2800">
+              <a:rPr lang="en-GB" sz="2800" dirty="0" smtClean="0">
                 <a:solidFill>
                   <a:srgbClr val="FFFF99"/>
                 </a:solidFill>
               </a:rPr>
-              <a:t> data – data replaced by order</a:t>
+              <a:t> </a:t>
+            </a:r>
+            <a:r>
+              <a:rPr lang="en-GB" sz="2800" dirty="0">
+                <a:solidFill>
+                  <a:srgbClr val="FFFF99"/>
+                </a:solidFill>
+              </a:rPr>
+              <a:t>data – data replaced by </a:t>
+            </a:r>
+            <a:r>
+              <a:rPr lang="en-GB" sz="2800" dirty="0" smtClean="0">
+                <a:solidFill>
+                  <a:srgbClr val="FFFF99"/>
+                </a:solidFill>
+              </a:rPr>
+              <a:t>order:</a:t>
+            </a:r>
+          </a:p>
+          <a:p>
+            <a:pPr marL="903288" lvl="1" indent="-446088" eaLnBrk="0" hangingPunct="0">
+              <a:lnSpc>
+                <a:spcPct val="110000"/>
+              </a:lnSpc>
+              <a:spcBef>
+                <a:spcPct val="20000"/>
+              </a:spcBef>
+              <a:buFont typeface="Arial" charset="0"/>
+              <a:buChar char="•"/>
+            </a:pPr>
+            <a:r>
+              <a:rPr lang="en-GB" sz="2800" dirty="0" smtClean="0">
+                <a:solidFill>
+                  <a:srgbClr val="FFFF99"/>
+                </a:solidFill>
+              </a:rPr>
+              <a:t>Data</a:t>
+            </a:r>
+            <a:r>
+              <a:rPr lang="en-GB" sz="2800" dirty="0">
+                <a:solidFill>
+                  <a:srgbClr val="FFFF99"/>
+                </a:solidFill>
+              </a:rPr>
+              <a:t>: [2.3, 4.5, 1.1, 9</a:t>
+            </a:r>
+            <a:r>
+              <a:rPr lang="en-GB" sz="2800" dirty="0" smtClean="0">
+                <a:solidFill>
+                  <a:srgbClr val="FFFF99"/>
+                </a:solidFill>
+              </a:rPr>
+              <a:t>]</a:t>
+            </a:r>
+          </a:p>
+          <a:p>
+            <a:pPr marL="903288" lvl="1" indent="-446088" eaLnBrk="0" hangingPunct="0">
+              <a:lnSpc>
+                <a:spcPct val="110000"/>
+              </a:lnSpc>
+              <a:spcBef>
+                <a:spcPct val="20000"/>
+              </a:spcBef>
+              <a:buFont typeface="Arial" charset="0"/>
+              <a:buChar char="•"/>
+            </a:pPr>
+            <a:r>
+              <a:rPr lang="en-GB" sz="2800" dirty="0" smtClean="0">
+                <a:solidFill>
+                  <a:srgbClr val="FFFF99"/>
+                </a:solidFill>
+              </a:rPr>
+              <a:t>Ranks </a:t>
+            </a:r>
+            <a:r>
+              <a:rPr lang="en-GB" sz="2800" dirty="0">
+                <a:solidFill>
+                  <a:srgbClr val="FFFF99"/>
+                </a:solidFill>
+              </a:rPr>
+              <a:t>[2,3,1,4]</a:t>
             </a:r>
           </a:p>
           <a:p>
@@ -19086,17 +19540,12 @@
               <a:spcBef>
                 <a:spcPct val="20000"/>
               </a:spcBef>
-              <a:buFont typeface="Arial" charset="0"/>
-              <a:buChar char="•"/>
-            </a:pPr>
-            <a:r>
-              <a:rPr lang="en-GB" sz="2800">
-                <a:solidFill>
-                  <a:srgbClr val="FFFF99"/>
-                </a:solidFill>
-              </a:rPr>
-              <a:t> E.g.  	Data: [2.3, 4.5, 1.1, 9]</a:t>
-            </a:r>
+            </a:pPr>
+            <a:endParaRPr lang="en-GB" sz="2800" dirty="0">
+              <a:solidFill>
+                <a:srgbClr val="F2F2F2"/>
+              </a:solidFill>
+            </a:endParaRPr>
           </a:p>
           <a:p>
             <a:pPr marL="446088" indent="-446088" eaLnBrk="0" hangingPunct="0">
@@ -19107,14 +19556,11 @@
                 <a:spcPct val="20000"/>
               </a:spcBef>
             </a:pPr>
-            <a:r>
-              <a:rPr lang="en-GB" sz="2800">
-                <a:solidFill>
-                  <a:srgbClr val="FFFF99"/>
-                </a:solidFill>
-              </a:rPr>
-              <a:t>	      	Ranks [2,3,1,4]</a:t>
-            </a:r>
+            <a:endParaRPr lang="en-GB" sz="2800" dirty="0">
+              <a:solidFill>
+                <a:srgbClr val="FFFF99"/>
+              </a:solidFill>
+            </a:endParaRPr>
           </a:p>
           <a:p>
             <a:pPr marL="446088" indent="-446088" eaLnBrk="0" hangingPunct="0">
@@ -19125,11 +19571,7 @@
                 <a:spcPct val="20000"/>
               </a:spcBef>
             </a:pPr>
-            <a:endParaRPr lang="en-GB" sz="2800">
-              <a:solidFill>
-                <a:srgbClr val="F2F2F2"/>
-              </a:solidFill>
-            </a:endParaRPr>
+            <a:endParaRPr lang="en-GB" sz="2800" dirty="0"/>
           </a:p>
           <a:p>
             <a:pPr marL="446088" indent="-446088" eaLnBrk="0" hangingPunct="0">
@@ -19140,11 +19582,7 @@
                 <a:spcPct val="20000"/>
               </a:spcBef>
             </a:pPr>
-            <a:endParaRPr lang="en-GB" sz="2800">
-              <a:solidFill>
-                <a:srgbClr val="FFFF99"/>
-              </a:solidFill>
-            </a:endParaRPr>
+            <a:endParaRPr lang="en-GB" sz="2800" dirty="0"/>
           </a:p>
           <a:p>
             <a:pPr marL="446088" indent="-446088" eaLnBrk="0" hangingPunct="0">
@@ -19155,30 +19593,8 @@
                 <a:spcPct val="20000"/>
               </a:spcBef>
             </a:pPr>
-            <a:endParaRPr lang="en-GB" sz="2800"/>
-          </a:p>
-          <a:p>
-            <a:pPr marL="446088" indent="-446088" eaLnBrk="0" hangingPunct="0">
-              <a:lnSpc>
-                <a:spcPct val="110000"/>
-              </a:lnSpc>
-              <a:spcBef>
-                <a:spcPct val="20000"/>
-              </a:spcBef>
-            </a:pPr>
-            <a:endParaRPr lang="en-GB" sz="2800"/>
-          </a:p>
-          <a:p>
-            <a:pPr marL="446088" indent="-446088" eaLnBrk="0" hangingPunct="0">
-              <a:lnSpc>
-                <a:spcPct val="110000"/>
-              </a:lnSpc>
-              <a:spcBef>
-                <a:spcPct val="20000"/>
-              </a:spcBef>
-            </a:pPr>
-            <a:r>
-              <a:rPr lang="en-GB" sz="2800"/>
+            <a:r>
+              <a:rPr lang="en-GB" sz="2800" dirty="0"/>
               <a:t>			</a:t>
             </a:r>
           </a:p>
@@ -19445,13 +19861,13 @@
                     </p:cTn>
                   </p:par>
                   <p:par>
-                    <p:cTn id="23" fill="hold" nodeType="clickPar">
+                    <p:cTn id="23" fill="hold">
                       <p:stCondLst>
                         <p:cond delay="indefinite"/>
                       </p:stCondLst>
                       <p:childTnLst>
                         <p:par>
-                          <p:cTn id="24" fill="hold" nodeType="withGroup">
+                          <p:cTn id="24" fill="hold">
                             <p:stCondLst>
                               <p:cond delay="0"/>
                             </p:stCondLst>
@@ -19506,13 +19922,13 @@
                     </p:cTn>
                   </p:par>
                   <p:par>
-                    <p:cTn id="28" fill="hold" nodeType="clickPar">
+                    <p:cTn id="28" fill="hold">
                       <p:stCondLst>
                         <p:cond delay="indefinite"/>
                       </p:stCondLst>
                       <p:childTnLst>
                         <p:par>
-                          <p:cTn id="29" fill="hold" nodeType="withGroup">
+                          <p:cTn id="29" fill="hold">
                             <p:stCondLst>
                               <p:cond delay="0"/>
                             </p:stCondLst>
@@ -19904,7 +20320,7 @@
               </a:spcBef>
             </a:pPr>
             <a:r>
-              <a:rPr lang="en-GB" sz="2800">
+              <a:rPr lang="en-GB" sz="2800" dirty="0">
                 <a:solidFill>
                   <a:srgbClr val="F2F2F2"/>
                 </a:solidFill>
@@ -19922,7 +20338,7 @@
               </a:spcBef>
             </a:pPr>
             <a:r>
-              <a:rPr lang="en-GB" sz="2800">
+              <a:rPr lang="en-GB" sz="2800" dirty="0">
                 <a:solidFill>
                   <a:srgbClr val="F2F2F2"/>
                 </a:solidFill>
@@ -19940,7 +20356,7 @@
               </a:spcBef>
             </a:pPr>
             <a:r>
-              <a:rPr lang="en-GB" sz="2800">
+              <a:rPr lang="en-GB" sz="2800" dirty="0">
                 <a:solidFill>
                   <a:srgbClr val="F2F2F2"/>
                 </a:solidFill>
@@ -19948,14 +20364,38 @@
               <a:t>	</a:t>
             </a:r>
             <a:r>
-              <a:rPr lang="en-GB" sz="2400">
+              <a:rPr lang="en-GB" sz="2400" dirty="0">
                 <a:solidFill>
                   <a:srgbClr val="FFFF99"/>
                 </a:solidFill>
               </a:rPr>
-              <a:t>Misses subtlety in data (e.g [2.3, 4.5, 1.1, 9000] ranked the same as [2.3, 4.5, 1.1, 5] )</a:t>
-            </a:r>
-            <a:endParaRPr lang="en-GB" sz="2800">
+              <a:t>Misses subtlety in data (</a:t>
+            </a:r>
+            <a:r>
+              <a:rPr lang="en-GB" sz="2400" dirty="0" err="1">
+                <a:solidFill>
+                  <a:srgbClr val="FFFF99"/>
+                </a:solidFill>
+              </a:rPr>
+              <a:t>e.g</a:t>
+            </a:r>
+            <a:r>
+              <a:rPr lang="en-GB" sz="2400" dirty="0">
+                <a:solidFill>
+                  <a:srgbClr val="FFFF99"/>
+                </a:solidFill>
+              </a:rPr>
+              <a:t> [2.3, 4.5, 1.1, 9000] ranked the same as [2.3, 4.5, 1.1, 5] </a:t>
+            </a:r>
+            <a:r>
+              <a:rPr lang="en-GB" sz="2400" dirty="0" smtClean="0">
+                <a:solidFill>
+                  <a:srgbClr val="FFFF99"/>
+                </a:solidFill>
+              </a:rPr>
+              <a:t>).</a:t>
+            </a:r>
+            <a:endParaRPr lang="en-GB" sz="2800" dirty="0">
               <a:solidFill>
                 <a:srgbClr val="FFFF99"/>
               </a:solidFill>
@@ -20054,13 +20494,34 @@
               </a:spcBef>
             </a:pPr>
             <a:r>
-              <a:rPr lang="en-GB" sz="2400">
+              <a:rPr lang="en-GB" sz="2400" dirty="0" smtClean="0">
                 <a:solidFill>
                   <a:srgbClr val="FFFF99"/>
                 </a:solidFill>
               </a:rPr>
-              <a:t>Doesn’t quite measure same thing as Pearson’s r </a:t>
-            </a:r>
+              <a:t>Does not </a:t>
+            </a:r>
+            <a:r>
+              <a:rPr lang="en-GB" sz="2400" dirty="0">
+                <a:solidFill>
+                  <a:srgbClr val="FFFF99"/>
+                </a:solidFill>
+              </a:rPr>
+              <a:t>quite measure same thing as Pearson’s </a:t>
+            </a:r>
+            <a:r>
+              <a:rPr lang="en-GB" sz="2400" dirty="0" smtClean="0">
+                <a:solidFill>
+                  <a:srgbClr val="FFFF99"/>
+                </a:solidFill>
+              </a:rPr>
+              <a:t>r.</a:t>
+            </a:r>
+            <a:endParaRPr lang="en-GB" sz="2400" dirty="0">
+              <a:solidFill>
+                <a:srgbClr val="FFFF99"/>
+              </a:solidFill>
+            </a:endParaRPr>
           </a:p>
           <a:p>
             <a:pPr marL="903288" lvl="1" indent="-446088" eaLnBrk="0" hangingPunct="0">
@@ -20072,13 +20533,26 @@
               </a:spcBef>
             </a:pPr>
             <a:r>
-              <a:rPr lang="en-GB" sz="2400">
+              <a:rPr lang="en-GB" sz="2400" dirty="0">
                 <a:solidFill>
                   <a:srgbClr val="FFFF99"/>
                 </a:solidFill>
               </a:rPr>
-              <a:t>Latter closer to most peoples concept of correlation</a:t>
-            </a:r>
+              <a:t>Latter closer to most peoples concept of </a:t>
+            </a:r>
+            <a:r>
+              <a:rPr lang="en-GB" sz="2400" dirty="0" smtClean="0">
+                <a:solidFill>
+                  <a:srgbClr val="FFFF99"/>
+                </a:solidFill>
+              </a:rPr>
+              <a:t>correlation.</a:t>
+            </a:r>
+            <a:endParaRPr lang="en-GB" sz="2400" dirty="0">
+              <a:solidFill>
+                <a:srgbClr val="FFFF99"/>
+              </a:solidFill>
+            </a:endParaRPr>
           </a:p>
           <a:p>
             <a:pPr marL="903288" lvl="1" indent="-446088" eaLnBrk="0" hangingPunct="0">
@@ -20089,7 +20563,7 @@
                 <a:spcPct val="20000"/>
               </a:spcBef>
             </a:pPr>
-            <a:endParaRPr lang="en-GB" sz="2400">
+            <a:endParaRPr lang="en-GB" sz="2400" dirty="0">
               <a:solidFill>
                 <a:srgbClr val="FFFF99"/>
               </a:solidFill>
@@ -20105,7 +20579,7 @@
               </a:spcBef>
             </a:pPr>
             <a:r>
-              <a:rPr lang="en-GB" sz="2400"/>
+              <a:rPr lang="en-GB" sz="2400" dirty="0"/>
               <a:t>Ideally – use Pearson’s if data</a:t>
             </a:r>
           </a:p>
@@ -20119,9 +20593,14 @@
               </a:spcBef>
             </a:pPr>
             <a:r>
-              <a:rPr lang="en-GB" sz="2400"/>
-              <a:t>Is normally distributed</a:t>
-            </a:r>
+              <a:rPr lang="en-GB" sz="2400" dirty="0"/>
+              <a:t>Is normally </a:t>
+            </a:r>
+            <a:r>
+              <a:rPr lang="en-GB" sz="2400" dirty="0" smtClean="0"/>
+              <a:t>distributed.</a:t>
+            </a:r>
+            <a:endParaRPr lang="en-GB" sz="2400" dirty="0"/>
           </a:p>
           <a:p>
             <a:pPr marL="903288" lvl="1" indent="-446088" eaLnBrk="0" hangingPunct="0">
@@ -20132,7 +20611,7 @@
                 <a:spcPct val="20000"/>
               </a:spcBef>
             </a:pPr>
-            <a:endParaRPr lang="en-GB" sz="2400">
+            <a:endParaRPr lang="en-GB" sz="2400" dirty="0">
               <a:solidFill>
                 <a:srgbClr val="F2F2F2"/>
               </a:solidFill>
@@ -20147,7 +20626,7 @@
                 <a:spcPct val="20000"/>
               </a:spcBef>
             </a:pPr>
-            <a:endParaRPr lang="en-GB" sz="2800">
+            <a:endParaRPr lang="en-GB" sz="2800" dirty="0">
               <a:solidFill>
                 <a:srgbClr val="FFFF99"/>
               </a:solidFill>
@@ -20162,7 +20641,7 @@
                 <a:spcPct val="20000"/>
               </a:spcBef>
             </a:pPr>
-            <a:endParaRPr lang="en-GB" sz="2800"/>
+            <a:endParaRPr lang="en-GB" sz="2800" dirty="0"/>
           </a:p>
           <a:p>
             <a:pPr marL="446088" indent="-446088" eaLnBrk="0" hangingPunct="0">
@@ -20173,7 +20652,7 @@
                 <a:spcPct val="20000"/>
               </a:spcBef>
             </a:pPr>
-            <a:endParaRPr lang="en-GB" sz="2800"/>
+            <a:endParaRPr lang="en-GB" sz="2800" dirty="0"/>
           </a:p>
           <a:p>
             <a:pPr marL="446088" indent="-446088" eaLnBrk="0" hangingPunct="0">
@@ -20185,7 +20664,7 @@
               </a:spcBef>
             </a:pPr>
             <a:r>
-              <a:rPr lang="en-GB" sz="2800"/>
+              <a:rPr lang="en-GB" sz="2800" dirty="0"/>
               <a:t>			</a:t>
             </a:r>
           </a:p>
@@ -20935,8 +21414,16 @@
               </a:spcBef>
             </a:pPr>
             <a:r>
-              <a:rPr lang="en-GB" sz="2800"/>
-              <a:t>For the first_year_marks.csv dataset:</a:t>
+              <a:rPr lang="en-GB" sz="2800" dirty="0"/>
+              <a:t>For the </a:t>
+            </a:r>
+            <a:r>
+              <a:rPr lang="en-GB" sz="2800" dirty="0" err="1"/>
+              <a:t>first_year_marks.csv</a:t>
+            </a:r>
+            <a:r>
+              <a:rPr lang="en-GB" sz="2800" dirty="0"/>
+              <a:t> dataset:</a:t>
             </a:r>
           </a:p>
           <a:p>
@@ -20948,9 +21435,18 @@
               <a:buAutoNum type="arabicPeriod"/>
             </a:pPr>
             <a:r>
-              <a:rPr lang="en-GB" sz="2400"/>
-              <a:t>Calculate r and p values using both Pearson’s and Spearman’s correlation methodologies</a:t>
-            </a:r>
+              <a:rPr lang="en-GB" sz="2400" dirty="0" smtClean="0"/>
+              <a:t> Calculate </a:t>
+            </a:r>
+            <a:r>
+              <a:rPr lang="en-GB" sz="2400" dirty="0"/>
+              <a:t>r and p values using both Pearson’s and Spearman’s correlation </a:t>
+            </a:r>
+            <a:r>
+              <a:rPr lang="en-GB" sz="2400" dirty="0" smtClean="0"/>
+              <a:t>methodologies.</a:t>
+            </a:r>
+            <a:endParaRPr lang="en-GB" sz="2400" dirty="0"/>
           </a:p>
           <a:p>
             <a:pPr eaLnBrk="0" hangingPunct="0">
@@ -20961,8 +21457,12 @@
               <a:buAutoNum type="arabicPeriod"/>
             </a:pPr>
             <a:r>
-              <a:rPr lang="en-GB" sz="2400"/>
-              <a:t>Are these data correlated at all? If so is the correlation weak or strong?</a:t>
+              <a:rPr lang="en-GB" sz="2400" dirty="0" smtClean="0"/>
+              <a:t> Are </a:t>
+            </a:r>
+            <a:r>
+              <a:rPr lang="en-GB" sz="2400" dirty="0"/>
+              <a:t>these data correlated at all? If so is the correlation weak or strong?</a:t>
             </a:r>
           </a:p>
           <a:p>
@@ -20974,8 +21474,12 @@
               <a:buAutoNum type="arabicPeriod"/>
             </a:pPr>
             <a:r>
-              <a:rPr lang="en-GB" sz="2400"/>
-              <a:t>Plot histograms of each of the two variables, and overlay normal curves to the histograms – how well do they match?</a:t>
+              <a:rPr lang="en-GB" sz="2400" dirty="0" smtClean="0"/>
+              <a:t> Plot </a:t>
+            </a:r>
+            <a:r>
+              <a:rPr lang="en-GB" sz="2400" dirty="0"/>
+              <a:t>histograms of each of the two variables, and overlay normal curves to the histograms – how well do they match?</a:t>
             </a:r>
           </a:p>
           <a:p>
@@ -20985,7 +21489,7 @@
               </a:spcBef>
             </a:pPr>
             <a:r>
-              <a:rPr lang="en-GB" sz="1800">
+              <a:rPr lang="en-GB" sz="1800" dirty="0">
                 <a:solidFill>
                   <a:srgbClr val="FFFF00"/>
                 </a:solidFill>
@@ -21000,15 +21504,95 @@
               </a:spcBef>
             </a:pPr>
             <a:r>
-              <a:rPr lang="en-GB" sz="1800">
+              <a:rPr lang="en-GB" sz="1800" dirty="0">
                 <a:solidFill>
                   <a:srgbClr val="FFFF00"/>
                 </a:solidFill>
               </a:rPr>
-              <a:t>Work out mean and standard deviation for each distribution, use numpy linspace (see handout) to generate x values, then norm.pdf (see handout) to generate the y values. To plot this over the histogram just call </a:t>
-            </a:r>
-            <a:r>
-              <a:rPr lang="en-GB" sz="1800" i="1">
+              <a:t>Work out mean and standard deviation for each distribution, use </a:t>
+            </a:r>
+            <a:r>
+              <a:rPr lang="en-GB" sz="1800" dirty="0" err="1">
+                <a:solidFill>
+                  <a:srgbClr val="FFFF00"/>
+                </a:solidFill>
+              </a:rPr>
+              <a:t>numpy</a:t>
+            </a:r>
+            <a:r>
+              <a:rPr lang="en-GB" sz="1800" dirty="0">
+                <a:solidFill>
+                  <a:srgbClr val="FFFF00"/>
+                </a:solidFill>
+              </a:rPr>
+              <a:t> </a:t>
+            </a:r>
+            <a:r>
+              <a:rPr lang="en-GB" sz="1800" dirty="0" err="1">
+                <a:solidFill>
+                  <a:srgbClr val="FFFF00"/>
+                </a:solidFill>
+              </a:rPr>
+              <a:t>linspace</a:t>
+            </a:r>
+            <a:r>
+              <a:rPr lang="en-GB" sz="1800" dirty="0">
+                <a:solidFill>
+                  <a:srgbClr val="FFFF00"/>
+                </a:solidFill>
+              </a:rPr>
+              <a:t> (see </a:t>
+            </a:r>
+            <a:r>
+              <a:rPr lang="en-GB" sz="1800" dirty="0" err="1">
+                <a:solidFill>
+                  <a:srgbClr val="FFFF00"/>
+                </a:solidFill>
+              </a:rPr>
+              <a:t>handout</a:t>
+            </a:r>
+            <a:r>
+              <a:rPr lang="en-GB" sz="1800" dirty="0">
+                <a:solidFill>
+                  <a:srgbClr val="FFFF00"/>
+                </a:solidFill>
+              </a:rPr>
+              <a:t>) to generate x values, then </a:t>
+            </a:r>
+            <a:r>
+              <a:rPr lang="en-GB" sz="1800" dirty="0" err="1">
+                <a:solidFill>
+                  <a:srgbClr val="FFFF00"/>
+                </a:solidFill>
+              </a:rPr>
+              <a:t>norm.pdf</a:t>
+            </a:r>
+            <a:r>
+              <a:rPr lang="en-GB" sz="1800" dirty="0">
+                <a:solidFill>
+                  <a:srgbClr val="FFFF00"/>
+                </a:solidFill>
+              </a:rPr>
+              <a:t> (see </a:t>
+            </a:r>
+            <a:r>
+              <a:rPr lang="en-GB" sz="1800" dirty="0" err="1">
+                <a:solidFill>
+                  <a:srgbClr val="FFFF00"/>
+                </a:solidFill>
+              </a:rPr>
+              <a:t>handout</a:t>
+            </a:r>
+            <a:r>
+              <a:rPr lang="en-GB" sz="1800" dirty="0">
+                <a:solidFill>
+                  <a:srgbClr val="FFFF00"/>
+                </a:solidFill>
+              </a:rPr>
+              <a:t>) to generate the y values. To plot this over the histogram just call </a:t>
+            </a:r>
+            <a:r>
+              <a:rPr lang="en-GB" sz="1800" i="1" dirty="0">
                 <a:solidFill>
                   <a:srgbClr val="FFFF00"/>
                 </a:solidFill>
@@ -21016,7 +21600,7 @@
               <a:t>plot</a:t>
             </a:r>
             <a:r>
-              <a:rPr lang="en-GB" sz="1800">
+              <a:rPr lang="en-GB" sz="1800" dirty="0">
                 <a:solidFill>
                   <a:srgbClr val="FFFF00"/>
                 </a:solidFill>
@@ -21024,7 +21608,7 @@
               <a:t> after calling </a:t>
             </a:r>
             <a:r>
-              <a:rPr lang="en-GB" sz="1800" i="1">
+              <a:rPr lang="en-GB" sz="1800" i="1" dirty="0">
                 <a:solidFill>
                   <a:srgbClr val="FFFF00"/>
                 </a:solidFill>
@@ -21032,7 +21616,7 @@
               <a:t>hist</a:t>
             </a:r>
             <a:r>
-              <a:rPr lang="en-GB" sz="1800">
+              <a:rPr lang="en-GB" sz="1800" dirty="0">
                 <a:solidFill>
                   <a:srgbClr val="FFFF00"/>
                 </a:solidFill>
@@ -21040,7 +21624,7 @@
               <a:t>. Note that the histogram will need to be ‘normalised’ (have it’s vertical scale turned into probabilities) for overlay of distribution to work properly – use the </a:t>
             </a:r>
             <a:r>
-              <a:rPr lang="en-GB" sz="1800" i="1">
+              <a:rPr lang="en-GB" sz="1800" i="1" dirty="0">
                 <a:solidFill>
                   <a:srgbClr val="FFFF00"/>
                 </a:solidFill>
@@ -21048,30 +21632,70 @@
               <a:t>normed=True</a:t>
             </a:r>
             <a:r>
-              <a:rPr lang="en-GB" sz="1800">
+              <a:rPr lang="en-GB" sz="1800" dirty="0">
                 <a:solidFill>
                   <a:srgbClr val="FFFF00"/>
                 </a:solidFill>
               </a:rPr>
-              <a:t> kwarg for the </a:t>
-            </a:r>
-            <a:r>
-              <a:rPr lang="en-GB" sz="1800" i="1">
+              <a:t> </a:t>
+            </a:r>
+            <a:r>
+              <a:rPr lang="en-GB" sz="1800" dirty="0" err="1">
                 <a:solidFill>
                   <a:srgbClr val="FFFF00"/>
                 </a:solidFill>
               </a:rPr>
-              <a:t>hist </a:t>
-            </a:r>
-            <a:r>
-              <a:rPr lang="en-GB" sz="1800">
+              <a:t>kwarg</a:t>
+            </a:r>
+            <a:r>
+              <a:rPr lang="en-GB" sz="1800" dirty="0">
                 <a:solidFill>
                   <a:srgbClr val="FFFF00"/>
                 </a:solidFill>
               </a:rPr>
-              <a:t>function – see handout from last session.</a:t>
-            </a:r>
-            <a:endParaRPr lang="en-GB" i="1">
+              <a:t> for the </a:t>
+            </a:r>
+            <a:r>
+              <a:rPr lang="en-GB" sz="1800" i="1" dirty="0" err="1">
+                <a:solidFill>
+                  <a:srgbClr val="FFFF00"/>
+                </a:solidFill>
+              </a:rPr>
+              <a:t>hist</a:t>
+            </a:r>
+            <a:r>
+              <a:rPr lang="en-GB" sz="1800" i="1" dirty="0">
+                <a:solidFill>
+                  <a:srgbClr val="FFFF00"/>
+                </a:solidFill>
+              </a:rPr>
+              <a:t> </a:t>
+            </a:r>
+            <a:r>
+              <a:rPr lang="en-GB" sz="1800" dirty="0">
+                <a:solidFill>
+                  <a:srgbClr val="FFFF00"/>
+                </a:solidFill>
+              </a:rPr>
+              <a:t>function – see </a:t>
+            </a:r>
+            <a:r>
+              <a:rPr lang="en-GB" sz="1800" dirty="0" err="1">
+                <a:solidFill>
+                  <a:srgbClr val="FFFF00"/>
+                </a:solidFill>
+              </a:rPr>
+              <a:t>handout</a:t>
+            </a:r>
+            <a:r>
+              <a:rPr lang="en-GB" sz="1800" dirty="0">
+                <a:solidFill>
+                  <a:srgbClr val="FFFF00"/>
+                </a:solidFill>
+              </a:rPr>
+              <a:t> from last session.</a:t>
+            </a:r>
+            <a:endParaRPr lang="en-GB" i="1" dirty="0">
               <a:solidFill>
                 <a:srgbClr val="FFFF00"/>
               </a:solidFill>
@@ -23129,14 +23753,10 @@
             </a:pPr>
             <a:r>
               <a:rPr lang="en-GB" sz="2800" dirty="0"/>
-              <a:t>Will just look at fitting straight lines – </a:t>
-            </a:r>
-            <a:r>
-              <a:rPr lang="en-GB" sz="2800"/>
-              <a:t>linear </a:t>
-            </a:r>
-            <a:r>
-              <a:rPr lang="en-GB" sz="2800" smtClean="0"/>
+              <a:t>Will just look at fitting straight lines – linear </a:t>
+            </a:r>
+            <a:r>
+              <a:rPr lang="en-GB" sz="2800" dirty="0" smtClean="0"/>
               <a:t>regression.</a:t>
             </a:r>
             <a:endParaRPr lang="en-GB" sz="2800" dirty="0"/>
@@ -23792,7 +24412,7 @@
               </a:spcBef>
             </a:pPr>
             <a:r>
-              <a:rPr lang="en-GB" sz="2800"/>
+              <a:rPr lang="en-GB" sz="2800" dirty="0"/>
               <a:t>Can just draw a line by eye... </a:t>
             </a:r>
           </a:p>
@@ -23806,9 +24426,14 @@
               </a:spcBef>
             </a:pPr>
             <a:r>
-              <a:rPr lang="en-GB" sz="2800"/>
-              <a:t>... but better to work it out mathematically</a:t>
-            </a:r>
+              <a:rPr lang="en-GB" sz="2800" dirty="0"/>
+              <a:t>... but better to work it out </a:t>
+            </a:r>
+            <a:r>
+              <a:rPr lang="en-GB" sz="2800" dirty="0" smtClean="0"/>
+              <a:t>mathematically.</a:t>
+            </a:r>
+            <a:endParaRPr lang="en-GB" sz="2800" dirty="0"/>
           </a:p>
           <a:p>
             <a:pPr marL="814388" indent="-814388" eaLnBrk="0" hangingPunct="0">
@@ -23820,7 +24445,7 @@
               </a:spcBef>
             </a:pPr>
             <a:r>
-              <a:rPr lang="en-GB" sz="2800"/>
+              <a:rPr lang="en-GB" sz="2800" dirty="0"/>
               <a:t>			</a:t>
             </a:r>
           </a:p>
@@ -24082,9 +24707,14 @@
               </a:spcBef>
             </a:pPr>
             <a:r>
-              <a:rPr lang="en-GB" sz="2400"/>
-              <a:t>Many mathematical methods exist to find the best fitting line</a:t>
-            </a:r>
+              <a:rPr lang="en-GB" sz="2400" dirty="0"/>
+              <a:t>Many mathematical methods exist to find the best fitting </a:t>
+            </a:r>
+            <a:r>
+              <a:rPr lang="en-GB" sz="2400" dirty="0" smtClean="0"/>
+              <a:t>line.</a:t>
+            </a:r>
+            <a:endParaRPr lang="en-GB" sz="2400" dirty="0"/>
           </a:p>
           <a:p>
             <a:pPr marL="266700" indent="-266700" eaLnBrk="0" hangingPunct="0">
@@ -24096,23 +24726,22 @@
               </a:spcBef>
             </a:pPr>
             <a:r>
-              <a:rPr lang="en-GB" sz="2400"/>
-              <a:t>By far most widely used is ‘least squares’ method</a:t>
-            </a:r>
-          </a:p>
-          <a:p>
-            <a:pPr marL="266700" indent="-266700" eaLnBrk="0" hangingPunct="0">
-              <a:lnSpc>
-                <a:spcPct val="110000"/>
-              </a:lnSpc>
-              <a:spcBef>
-                <a:spcPct val="20000"/>
-              </a:spcBef>
-            </a:pPr>
-            <a:r>
-              <a:rPr lang="en-GB" sz="2400"/>
-              <a:t>Minimises sum of squares of vertical errors</a:t>
-            </a:r>
+              <a:rPr lang="en-GB" sz="2400" dirty="0"/>
+              <a:t>By far most widely used is ‘least squares’ </a:t>
+            </a:r>
+            <a:r>
+              <a:rPr lang="en-GB" sz="2400" dirty="0" smtClean="0"/>
+              <a:t>method - minimises </a:t>
+            </a:r>
+            <a:r>
+              <a:rPr lang="en-GB" sz="2400" dirty="0"/>
+              <a:t>sum of squares of vertical </a:t>
+            </a:r>
+            <a:r>
+              <a:rPr lang="en-GB" sz="2400" dirty="0" smtClean="0"/>
+              <a:t>errors.</a:t>
+            </a:r>
+            <a:endParaRPr lang="en-GB" sz="2400" dirty="0"/>
           </a:p>
         </p:txBody>
       </p:sp>
@@ -24169,15 +24798,15 @@
               </a:spcBef>
             </a:pPr>
             <a:r>
-              <a:rPr lang="en-GB" sz="2400"/>
+              <a:rPr lang="en-GB" sz="2400" dirty="0"/>
               <a:t>Compute in Python with </a:t>
             </a:r>
             <a:r>
-              <a:rPr lang="en-GB" sz="2400" i="1"/>
+              <a:rPr lang="en-GB" sz="2400" i="1" dirty="0" err="1"/>
               <a:t>scipy.stats.linregress</a:t>
             </a:r>
             <a:r>
-              <a:rPr lang="en-GB" sz="2400"/>
+              <a:rPr lang="en-GB" sz="2400" dirty="0"/>
               <a:t> function</a:t>
             </a:r>
           </a:p>
@@ -24191,35 +24820,35 @@
               </a:spcBef>
             </a:pPr>
             <a:r>
-              <a:rPr lang="en-GB" sz="2400"/>
-              <a:t>Returns slope and intercept – </a:t>
-            </a:r>
-            <a:r>
-              <a:rPr lang="en-GB" sz="2400" i="1"/>
+              <a:rPr lang="en-GB" sz="2400" dirty="0"/>
+              <a:t>Returns </a:t>
+            </a:r>
+            <a:r>
+              <a:rPr lang="en-GB" sz="2400" dirty="0" smtClean="0"/>
+              <a:t>the slope (s) </a:t>
+            </a:r>
+            <a:r>
+              <a:rPr lang="en-GB" sz="2400" dirty="0"/>
+              <a:t>and </a:t>
+            </a:r>
+            <a:r>
+              <a:rPr lang="en-GB" sz="2400" dirty="0" smtClean="0"/>
+              <a:t>intercept (c) for the equation of the line y </a:t>
+            </a:r>
+            <a:r>
+              <a:rPr lang="en-GB" sz="2400" dirty="0"/>
+              <a:t>= </a:t>
+            </a:r>
+            <a:r>
+              <a:rPr lang="en-GB" sz="2400" i="1" dirty="0"/>
               <a:t>m</a:t>
             </a:r>
             <a:r>
-              <a:rPr lang="en-GB" sz="2400"/>
-              <a:t> and </a:t>
-            </a:r>
-            <a:r>
-              <a:rPr lang="en-GB" sz="2400" i="1"/>
-              <a:t>c</a:t>
-            </a:r>
-            <a:r>
-              <a:rPr lang="en-GB" sz="2400"/>
-              <a:t> in y = </a:t>
-            </a:r>
-            <a:r>
-              <a:rPr lang="en-GB" sz="2400" i="1"/>
-              <a:t>m</a:t>
-            </a:r>
-            <a:r>
-              <a:rPr lang="en-GB" sz="2400"/>
+              <a:rPr lang="en-GB" sz="2400" dirty="0"/>
               <a:t>x + </a:t>
             </a:r>
             <a:r>
-              <a:rPr lang="en-GB" sz="2400" i="1"/>
+              <a:rPr lang="en-GB" sz="2400" i="1" dirty="0"/>
               <a:t>c</a:t>
             </a:r>
           </a:p>
@@ -24232,25 +24861,7 @@
                 <a:spcPct val="20000"/>
               </a:spcBef>
             </a:pPr>
-            <a:r>
-              <a:rPr lang="en-GB" sz="2400">
-                <a:solidFill>
-                  <a:srgbClr val="FFC000"/>
-                </a:solidFill>
-              </a:rPr>
-              <a:t>[Ignore rest of returns for now]</a:t>
-            </a:r>
-          </a:p>
-          <a:p>
-            <a:pPr marL="266700" indent="-266700" eaLnBrk="0" hangingPunct="0">
-              <a:lnSpc>
-                <a:spcPct val="110000"/>
-              </a:lnSpc>
-              <a:spcBef>
-                <a:spcPct val="20000"/>
-              </a:spcBef>
-            </a:pPr>
-            <a:endParaRPr lang="en-GB" sz="2800"/>
+            <a:endParaRPr lang="en-GB" sz="2800" dirty="0"/>
           </a:p>
         </p:txBody>
       </p:sp>
@@ -24637,9 +25248,9 @@
                                           </p:stCondLst>
                                         </p:cTn>
                                         <p:tgtEl>
-                                          <p:spTgt spid="10">
+                                          <p:spTgt spid="11">
                                             <p:txEl>
-                                              <p:pRg st="2" end="2"/>
+                                              <p:pRg st="0" end="0"/>
                                             </p:txEl>
                                           </p:spTgt>
                                         </p:tgtEl>
@@ -24655,9 +25266,9 @@
                                       <p:cBhvr>
                                         <p:cTn id="36" dur="500"/>
                                         <p:tgtEl>
-                                          <p:spTgt spid="10">
+                                          <p:spTgt spid="11">
                                             <p:txEl>
-                                              <p:pRg st="2" end="2"/>
+                                              <p:pRg st="0" end="0"/>
                                             </p:txEl>
                                           </p:spTgt>
                                         </p:tgtEl>
@@ -24700,7 +25311,7 @@
                                         <p:tgtEl>
                                           <p:spTgt spid="11">
                                             <p:txEl>
-                                              <p:pRg st="0" end="0"/>
+                                              <p:pRg st="1" end="1"/>
                                             </p:txEl>
                                           </p:spTgt>
                                         </p:tgtEl>
@@ -24718,129 +25329,7 @@
                                         <p:tgtEl>
                                           <p:spTgt spid="11">
                                             <p:txEl>
-                                              <p:pRg st="0" end="0"/>
-                                            </p:txEl>
-                                          </p:spTgt>
-                                        </p:tgtEl>
-                                      </p:cBhvr>
-                                    </p:animEffect>
-                                  </p:childTnLst>
-                                </p:cTn>
-                              </p:par>
-                            </p:childTnLst>
-                          </p:cTn>
-                        </p:par>
-                      </p:childTnLst>
-                    </p:cTn>
-                  </p:par>
-                  <p:par>
-                    <p:cTn id="42" fill="hold" nodeType="clickPar">
-                      <p:stCondLst>
-                        <p:cond delay="indefinite"/>
-                      </p:stCondLst>
-                      <p:childTnLst>
-                        <p:par>
-                          <p:cTn id="43" fill="hold" nodeType="withGroup">
-                            <p:stCondLst>
-                              <p:cond delay="0"/>
-                            </p:stCondLst>
-                            <p:childTnLst>
-                              <p:par>
-                                <p:cTn id="44" presetID="10" presetClass="entr" presetSubtype="0" fill="hold" grpId="0" nodeType="clickEffect">
-                                  <p:stCondLst>
-                                    <p:cond delay="0"/>
-                                  </p:stCondLst>
-                                  <p:childTnLst>
-                                    <p:set>
-                                      <p:cBhvr>
-                                        <p:cTn id="45" dur="1" fill="hold">
-                                          <p:stCondLst>
-                                            <p:cond delay="0"/>
-                                          </p:stCondLst>
-                                        </p:cTn>
-                                        <p:tgtEl>
-                                          <p:spTgt spid="11">
-                                            <p:txEl>
                                               <p:pRg st="1" end="1"/>
-                                            </p:txEl>
-                                          </p:spTgt>
-                                        </p:tgtEl>
-                                        <p:attrNameLst>
-                                          <p:attrName>style.visibility</p:attrName>
-                                        </p:attrNameLst>
-                                      </p:cBhvr>
-                                      <p:to>
-                                        <p:strVal val="visible"/>
-                                      </p:to>
-                                    </p:set>
-                                    <p:animEffect transition="in" filter="fade">
-                                      <p:cBhvr>
-                                        <p:cTn id="46" dur="500"/>
-                                        <p:tgtEl>
-                                          <p:spTgt spid="11">
-                                            <p:txEl>
-                                              <p:pRg st="1" end="1"/>
-                                            </p:txEl>
-                                          </p:spTgt>
-                                        </p:tgtEl>
-                                      </p:cBhvr>
-                                    </p:animEffect>
-                                  </p:childTnLst>
-                                </p:cTn>
-                              </p:par>
-                            </p:childTnLst>
-                          </p:cTn>
-                        </p:par>
-                      </p:childTnLst>
-                    </p:cTn>
-                  </p:par>
-                  <p:par>
-                    <p:cTn id="47" fill="hold" nodeType="clickPar">
-                      <p:stCondLst>
-                        <p:cond delay="indefinite"/>
-                      </p:stCondLst>
-                      <p:childTnLst>
-                        <p:par>
-                          <p:cTn id="48" fill="hold" nodeType="withGroup">
-                            <p:stCondLst>
-                              <p:cond delay="0"/>
-                            </p:stCondLst>
-                            <p:childTnLst>
-                              <p:par>
-                                <p:cTn id="49" presetID="10" presetClass="entr" presetSubtype="0" fill="hold" grpId="0" nodeType="clickEffect">
-                                  <p:stCondLst>
-                                    <p:cond delay="0"/>
-                                  </p:stCondLst>
-                                  <p:childTnLst>
-                                    <p:set>
-                                      <p:cBhvr>
-                                        <p:cTn id="50" dur="1" fill="hold">
-                                          <p:stCondLst>
-                                            <p:cond delay="0"/>
-                                          </p:stCondLst>
-                                        </p:cTn>
-                                        <p:tgtEl>
-                                          <p:spTgt spid="11">
-                                            <p:txEl>
-                                              <p:pRg st="2" end="2"/>
-                                            </p:txEl>
-                                          </p:spTgt>
-                                        </p:tgtEl>
-                                        <p:attrNameLst>
-                                          <p:attrName>style.visibility</p:attrName>
-                                        </p:attrNameLst>
-                                      </p:cBhvr>
-                                      <p:to>
-                                        <p:strVal val="visible"/>
-                                      </p:to>
-                                    </p:set>
-                                    <p:animEffect transition="in" filter="fade">
-                                      <p:cBhvr>
-                                        <p:cTn id="51" dur="500"/>
-                                        <p:tgtEl>
-                                          <p:spTgt spid="11">
-                                            <p:txEl>
-                                              <p:pRg st="2" end="2"/>
                                             </p:txEl>
                                           </p:spTgt>
                                         </p:tgtEl>
@@ -25668,250 +26157,8 @@
                 </a:lnSpc>
                 <a:defRPr/>
               </a:pPr>
-              <a:endParaRPr lang="en-GB" sz="2400" dirty="0">
-                <a:solidFill>
-                  <a:srgbClr val="FFFF00"/>
-                </a:solidFill>
-                <a:effectLst>
-                  <a:outerShdw blurRad="38100" dist="38100" dir="2700000" algn="tl">
-                    <a:srgbClr val="FFFFFF"/>
-                  </a:outerShdw>
-                </a:effectLst>
-                <a:latin typeface="Arial Black" pitchFamily="34" charset="0"/>
-                <a:ea typeface="+mn-ea"/>
-                <a:cs typeface="+mn-cs"/>
-              </a:endParaRPr>
-            </a:p>
-            <a:p>
-              <a:pPr algn="ctr" eaLnBrk="0" hangingPunct="0">
-                <a:lnSpc>
-                  <a:spcPct val="120000"/>
-                </a:lnSpc>
-                <a:defRPr/>
-              </a:pPr>
               <a:r>
-                <a:rPr lang="en-GB" sz="2400" dirty="0">
-                  <a:solidFill>
-                    <a:srgbClr val="FFFF00"/>
-                  </a:solidFill>
-                  <a:effectLst>
-                    <a:outerShdw blurRad="38100" dist="38100" dir="2700000" algn="tl">
-                      <a:srgbClr val="FFFFFF"/>
-                    </a:outerShdw>
-                  </a:effectLst>
-                  <a:latin typeface="Arial Black" pitchFamily="34" charset="0"/>
-                  <a:ea typeface="+mn-ea"/>
-                  <a:cs typeface="+mn-cs"/>
-                </a:rPr>
-                <a:t>ERRATUM</a:t>
-              </a:r>
-            </a:p>
-            <a:p>
-              <a:pPr algn="ctr" eaLnBrk="0" hangingPunct="0">
-                <a:lnSpc>
-                  <a:spcPct val="120000"/>
-                </a:lnSpc>
-                <a:defRPr/>
-              </a:pPr>
-              <a:r>
-                <a:rPr lang="en-GB" sz="2400" dirty="0">
-                  <a:solidFill>
-                    <a:srgbClr val="FFFF00"/>
-                  </a:solidFill>
-                  <a:effectLst>
-                    <a:outerShdw blurRad="38100" dist="38100" dir="2700000" algn="tl">
-                      <a:srgbClr val="FFFFFF"/>
-                    </a:outerShdw>
-                  </a:effectLst>
-                  <a:latin typeface="Arial Black" pitchFamily="34" charset="0"/>
-                  <a:ea typeface="+mn-ea"/>
-                  <a:cs typeface="+mn-cs"/>
-                </a:rPr>
-                <a:t>Sample Program, 1</a:t>
-              </a:r>
-              <a:r>
-                <a:rPr lang="en-GB" sz="2400" baseline="30000" dirty="0">
-                  <a:solidFill>
-                    <a:srgbClr val="FFFF00"/>
-                  </a:solidFill>
-                  <a:effectLst>
-                    <a:outerShdw blurRad="38100" dist="38100" dir="2700000" algn="tl">
-                      <a:srgbClr val="FFFFFF"/>
-                    </a:outerShdw>
-                  </a:effectLst>
-                  <a:latin typeface="Arial Black" pitchFamily="34" charset="0"/>
-                  <a:ea typeface="+mn-ea"/>
-                  <a:cs typeface="+mn-cs"/>
-                </a:rPr>
-                <a:t>st</a:t>
-              </a:r>
-              <a:r>
-                <a:rPr lang="en-GB" sz="2400" dirty="0">
-                  <a:solidFill>
-                    <a:srgbClr val="FFFF00"/>
-                  </a:solidFill>
-                  <a:effectLst>
-                    <a:outerShdw blurRad="38100" dist="38100" dir="2700000" algn="tl">
-                      <a:srgbClr val="FFFFFF"/>
-                    </a:outerShdw>
-                  </a:effectLst>
-                  <a:latin typeface="Arial Black" pitchFamily="34" charset="0"/>
-                  <a:ea typeface="+mn-ea"/>
-                  <a:cs typeface="+mn-cs"/>
-                </a:rPr>
-                <a:t> line on </a:t>
-              </a:r>
-              <a:r>
-                <a:rPr lang="en-GB" sz="2400" dirty="0" err="1">
-                  <a:solidFill>
-                    <a:srgbClr val="FFFF00"/>
-                  </a:solidFill>
-                  <a:effectLst>
-                    <a:outerShdw blurRad="38100" dist="38100" dir="2700000" algn="tl">
-                      <a:srgbClr val="FFFFFF"/>
-                    </a:outerShdw>
-                  </a:effectLst>
-                  <a:latin typeface="Arial Black" pitchFamily="34" charset="0"/>
-                  <a:ea typeface="+mn-ea"/>
-                  <a:cs typeface="+mn-cs"/>
-                </a:rPr>
-                <a:t>handout</a:t>
-              </a:r>
-              <a:endParaRPr lang="en-GB" sz="2400" dirty="0">
-                <a:solidFill>
-                  <a:srgbClr val="FFFF00"/>
-                </a:solidFill>
-                <a:effectLst>
-                  <a:outerShdw blurRad="38100" dist="38100" dir="2700000" algn="tl">
-                    <a:srgbClr val="FFFFFF"/>
-                  </a:outerShdw>
-                </a:effectLst>
-                <a:latin typeface="Arial Black" pitchFamily="34" charset="0"/>
-                <a:ea typeface="+mn-ea"/>
-                <a:cs typeface="+mn-cs"/>
-              </a:endParaRPr>
-            </a:p>
-            <a:p>
-              <a:pPr algn="ctr" eaLnBrk="0" hangingPunct="0">
-                <a:lnSpc>
-                  <a:spcPct val="120000"/>
-                </a:lnSpc>
-                <a:defRPr/>
-              </a:pPr>
-              <a:r>
-                <a:rPr lang="en-GB" sz="2400" dirty="0">
-                  <a:solidFill>
-                    <a:srgbClr val="FFFF00"/>
-                  </a:solidFill>
-                  <a:effectLst>
-                    <a:outerShdw blurRad="38100" dist="38100" dir="2700000" algn="tl">
-                      <a:srgbClr val="FFFFFF"/>
-                    </a:outerShdw>
-                  </a:effectLst>
-                  <a:latin typeface="Arial Black" pitchFamily="34" charset="0"/>
-                  <a:ea typeface="+mn-ea"/>
-                  <a:cs typeface="+mn-cs"/>
-                </a:rPr>
-                <a:t>Should </a:t>
-              </a:r>
-              <a:r>
-                <a:rPr lang="en-GB" sz="2400" dirty="0" err="1">
-                  <a:solidFill>
-                    <a:srgbClr val="FFFF00"/>
-                  </a:solidFill>
-                  <a:effectLst>
-                    <a:outerShdw blurRad="38100" dist="38100" dir="2700000" algn="tl">
-                      <a:srgbClr val="FFFFFF"/>
-                    </a:outerShdw>
-                  </a:effectLst>
-                  <a:latin typeface="Arial Black" pitchFamily="34" charset="0"/>
-                  <a:ea typeface="+mn-ea"/>
-                  <a:cs typeface="+mn-cs"/>
-                </a:rPr>
-                <a:t>be</a:t>
-              </a:r>
-              <a:r>
-                <a:rPr lang="en-GB" sz="2400" i="1" dirty="0" err="1">
-                  <a:solidFill>
-                    <a:srgbClr val="FFFF00"/>
-                  </a:solidFill>
-                  <a:effectLst>
-                    <a:outerShdw blurRad="38100" dist="38100" dir="2700000" algn="tl">
-                      <a:srgbClr val="FFFFFF"/>
-                    </a:outerShdw>
-                  </a:effectLst>
-                  <a:latin typeface="Arial Black" pitchFamily="34" charset="0"/>
-                  <a:ea typeface="+mn-ea"/>
-                  <a:cs typeface="+mn-cs"/>
-                </a:rPr>
-                <a:t>%pylab</a:t>
-              </a:r>
-              <a:r>
-                <a:rPr lang="en-GB" sz="2400" i="1" dirty="0">
-                  <a:solidFill>
-                    <a:srgbClr val="FFFF00"/>
-                  </a:solidFill>
-                  <a:effectLst>
-                    <a:outerShdw blurRad="38100" dist="38100" dir="2700000" algn="tl">
-                      <a:srgbClr val="FFFFFF"/>
-                    </a:outerShdw>
-                  </a:effectLst>
-                  <a:latin typeface="Arial Black" pitchFamily="34" charset="0"/>
-                  <a:ea typeface="+mn-ea"/>
-                  <a:cs typeface="+mn-cs"/>
-                </a:rPr>
-                <a:t> inline </a:t>
-              </a:r>
-              <a:r>
-                <a:rPr lang="en-GB" sz="2400" dirty="0">
-                  <a:solidFill>
-                    <a:srgbClr val="FFFF00"/>
-                  </a:solidFill>
-                  <a:effectLst>
-                    <a:outerShdw blurRad="38100" dist="38100" dir="2700000" algn="tl">
-                      <a:srgbClr val="FFFFFF"/>
-                    </a:outerShdw>
-                  </a:effectLst>
-                  <a:latin typeface="Arial Black" pitchFamily="34" charset="0"/>
-                  <a:ea typeface="+mn-ea"/>
-                  <a:cs typeface="+mn-cs"/>
-                </a:rPr>
-                <a:t>NOT </a:t>
-              </a:r>
-              <a:r>
-                <a:rPr lang="en-GB" sz="2400" i="1" dirty="0">
-                  <a:solidFill>
-                    <a:srgbClr val="FFFF00"/>
-                  </a:solidFill>
-                  <a:effectLst>
-                    <a:outerShdw blurRad="38100" dist="38100" dir="2700000" algn="tl">
-                      <a:srgbClr val="FFFFFF"/>
-                    </a:outerShdw>
-                  </a:effectLst>
-                  <a:latin typeface="Arial Black" pitchFamily="34" charset="0"/>
-                  <a:ea typeface="+mn-ea"/>
-                  <a:cs typeface="+mn-cs"/>
-                </a:rPr>
-                <a:t>%inline </a:t>
-              </a:r>
-              <a:r>
-                <a:rPr lang="en-GB" sz="2400" i="1" dirty="0" err="1">
-                  <a:solidFill>
-                    <a:srgbClr val="FFFF00"/>
-                  </a:solidFill>
-                  <a:effectLst>
-                    <a:outerShdw blurRad="38100" dist="38100" dir="2700000" algn="tl">
-                      <a:srgbClr val="FFFFFF"/>
-                    </a:outerShdw>
-                  </a:effectLst>
-                  <a:latin typeface="Arial Black" pitchFamily="34" charset="0"/>
-                  <a:ea typeface="+mn-ea"/>
-                  <a:cs typeface="+mn-cs"/>
-                </a:rPr>
-                <a:t>pylab</a:t>
-              </a:r>
-              <a:r>
-                <a:rPr lang="en-GB" sz="2400" i="1" dirty="0">
+                <a:rPr lang="en-GB" sz="2400" i="1" dirty="0" smtClean="0">
                   <a:solidFill>
                     <a:srgbClr val="FFFF00"/>
                   </a:solidFill>
@@ -26282,14 +26529,14 @@
               </a:spcBef>
             </a:pPr>
             <a:r>
-              <a:rPr lang="en-GB" sz="2800"/>
+              <a:rPr lang="en-GB" sz="2800" dirty="0"/>
               <a:t>Plotting a scatter diagram gives a visual feel for how well two variables are related, or </a:t>
             </a:r>
             <a:r>
-              <a:rPr lang="en-GB" sz="2800" i="1"/>
-              <a:t>correlated</a:t>
-            </a:r>
-            <a:endParaRPr lang="en-GB" sz="2800"/>
+              <a:rPr lang="en-GB" sz="2800" i="1" dirty="0" smtClean="0"/>
+              <a:t>correlated.</a:t>
+            </a:r>
+            <a:endParaRPr lang="en-GB" sz="2800" dirty="0"/>
           </a:p>
           <a:p>
             <a:pPr marL="814388" indent="-814388" eaLnBrk="0" hangingPunct="0">
@@ -26301,7 +26548,7 @@
               </a:spcBef>
             </a:pPr>
             <a:r>
-              <a:rPr lang="en-GB" sz="2800"/>
+              <a:rPr lang="en-GB" sz="2800" dirty="0"/>
               <a:t>Correlation can also be defined mathematically</a:t>
             </a:r>
           </a:p>
@@ -26315,12 +26562,28 @@
               </a:spcBef>
             </a:pPr>
             <a:r>
-              <a:rPr lang="en-GB" sz="2800">
+              <a:rPr lang="en-GB" sz="2800" dirty="0">
                 <a:solidFill>
                   <a:srgbClr val="FFFF99"/>
                 </a:solidFill>
               </a:rPr>
-              <a:t>Correlation coefficients (r-values) range -1 to 1</a:t>
+              <a:t>Correlation coefficients (</a:t>
+            </a:r>
+            <a:r>
+              <a:rPr lang="en-GB" sz="2800" dirty="0" err="1">
+                <a:solidFill>
+                  <a:srgbClr val="FFFF99"/>
+                </a:solidFill>
+              </a:rPr>
+              <a:t>r-values</a:t>
+            </a:r>
+            <a:r>
+              <a:rPr lang="en-GB" sz="2800" dirty="0">
+                <a:solidFill>
+                  <a:srgbClr val="FFFF99"/>
+                </a:solidFill>
+              </a:rPr>
+              <a:t>) range -1 to 1</a:t>
             </a:r>
           </a:p>
           <a:p>
@@ -26332,7 +26595,7 @@
                 <a:spcPct val="20000"/>
               </a:spcBef>
             </a:pPr>
-            <a:endParaRPr lang="en-GB" sz="2800"/>
+            <a:endParaRPr lang="en-GB" sz="2800" dirty="0"/>
           </a:p>
           <a:p>
             <a:pPr marL="814388" indent="-814388" eaLnBrk="0" hangingPunct="0">
@@ -26343,7 +26606,7 @@
                 <a:spcPct val="20000"/>
               </a:spcBef>
             </a:pPr>
-            <a:endParaRPr lang="en-GB" sz="2800"/>
+            <a:endParaRPr lang="en-GB" sz="2800" dirty="0"/>
           </a:p>
           <a:p>
             <a:pPr marL="814388" indent="-814388" eaLnBrk="0" hangingPunct="0">
@@ -26355,7 +26618,7 @@
               </a:spcBef>
             </a:pPr>
             <a:r>
-              <a:rPr lang="en-GB" sz="2800"/>
+              <a:rPr lang="en-GB" sz="2800" dirty="0"/>
               <a:t>			</a:t>
             </a:r>
           </a:p>
@@ -27982,9 +28245,14 @@
               </a:spcBef>
             </a:pPr>
             <a:r>
-              <a:rPr lang="en-GB" sz="2800"/>
-              <a:t>Two commonly used methods for calculating correlation coefficients</a:t>
-            </a:r>
+              <a:rPr lang="en-GB" sz="2800" dirty="0"/>
+              <a:t>Two commonly used methods for calculating correlation </a:t>
+            </a:r>
+            <a:r>
+              <a:rPr lang="en-GB" sz="2800" dirty="0" smtClean="0"/>
+              <a:t>coefficients:</a:t>
+            </a:r>
+            <a:endParaRPr lang="en-GB" sz="2800" dirty="0"/>
           </a:p>
           <a:p>
             <a:pPr marL="814388" indent="-814388" eaLnBrk="0" hangingPunct="0">
@@ -27998,13 +28266,26 @@
               <a:buChar char="-"/>
             </a:pPr>
             <a:r>
-              <a:rPr lang="en-GB" sz="2800">
+              <a:rPr lang="en-GB" sz="2800" dirty="0">
                 <a:solidFill>
                   <a:srgbClr val="FFFF99"/>
                 </a:solidFill>
               </a:rPr>
-              <a:t>Pearson Product-moment Correlation Coefficient</a:t>
-            </a:r>
+              <a:t>Pearson Product-moment Correlation </a:t>
+            </a:r>
+            <a:r>
+              <a:rPr lang="en-GB" sz="2800" dirty="0" smtClean="0">
+                <a:solidFill>
+                  <a:srgbClr val="FFFF99"/>
+                </a:solidFill>
+              </a:rPr>
+              <a:t>Coefficient.</a:t>
+            </a:r>
+            <a:endParaRPr lang="en-GB" sz="2800" dirty="0">
+              <a:solidFill>
+                <a:srgbClr val="FFFF99"/>
+              </a:solidFill>
+            </a:endParaRPr>
           </a:p>
           <a:p>
             <a:pPr marL="814388" indent="-814388" eaLnBrk="0" hangingPunct="0">
@@ -28018,13 +28299,26 @@
               <a:buChar char="-"/>
             </a:pPr>
             <a:r>
-              <a:rPr lang="en-GB" sz="2800">
+              <a:rPr lang="en-GB" sz="2800" dirty="0">
                 <a:solidFill>
                   <a:srgbClr val="FFFF99"/>
                 </a:solidFill>
               </a:rPr>
-              <a:t>Spearman’s Rank Correlation Coefficient</a:t>
-            </a:r>
+              <a:t>Spearman’s Rank Correlation </a:t>
+            </a:r>
+            <a:r>
+              <a:rPr lang="en-GB" sz="2800" dirty="0" smtClean="0">
+                <a:solidFill>
+                  <a:srgbClr val="FFFF99"/>
+                </a:solidFill>
+              </a:rPr>
+              <a:t>Coefficient.</a:t>
+            </a:r>
+            <a:endParaRPr lang="en-GB" sz="2800" dirty="0">
+              <a:solidFill>
+                <a:srgbClr val="FFFF99"/>
+              </a:solidFill>
+            </a:endParaRPr>
           </a:p>
           <a:p>
             <a:pPr marL="814388" indent="-814388" eaLnBrk="0" hangingPunct="0">
@@ -28036,9 +28330,14 @@
               </a:spcBef>
             </a:pPr>
             <a:r>
-              <a:rPr lang="en-GB" sz="2800"/>
-              <a:t>To explain them and the differences between them we need to cover a few more basic concepts...</a:t>
-            </a:r>
+              <a:rPr lang="en-GB" sz="2800" dirty="0"/>
+              <a:t>To explain them and the differences between them we need to cover a few more basic concepts</a:t>
+            </a:r>
+            <a:r>
+              <a:rPr lang="en-GB" sz="2800" dirty="0" smtClean="0"/>
+              <a:t>.</a:t>
+            </a:r>
+            <a:endParaRPr lang="en-GB" sz="2800" dirty="0"/>
           </a:p>
           <a:p>
             <a:pPr marL="814388" indent="-814388" eaLnBrk="0" hangingPunct="0">
@@ -28052,13 +28351,18 @@
               <a:buAutoNum type="arabicPeriod"/>
             </a:pPr>
             <a:r>
-              <a:rPr lang="en-GB" sz="2800">
+              <a:rPr lang="en-GB" sz="2800" dirty="0" smtClean="0">
                 <a:solidFill>
                   <a:srgbClr val="FFFF99"/>
                 </a:solidFill>
               </a:rPr>
-              <a:t>Probability</a:t>
-            </a:r>
+              <a:t>Probability.</a:t>
+            </a:r>
+            <a:endParaRPr lang="en-GB" sz="2800" dirty="0">
+              <a:solidFill>
+                <a:srgbClr val="FFFF99"/>
+              </a:solidFill>
+            </a:endParaRPr>
           </a:p>
           <a:p>
             <a:pPr marL="814388" indent="-814388" eaLnBrk="0" hangingPunct="0">
@@ -28072,13 +28376,26 @@
               <a:buAutoNum type="arabicPeriod"/>
             </a:pPr>
             <a:r>
-              <a:rPr lang="en-GB" sz="2800">
+              <a:rPr lang="en-GB" sz="2800" dirty="0">
                 <a:solidFill>
                   <a:srgbClr val="FFFF99"/>
                 </a:solidFill>
               </a:rPr>
-              <a:t>Normal distributions</a:t>
-            </a:r>
+              <a:t>Normal </a:t>
+            </a:r>
+            <a:r>
+              <a:rPr lang="en-GB" sz="2800" dirty="0" smtClean="0">
+                <a:solidFill>
+                  <a:srgbClr val="FFFF99"/>
+                </a:solidFill>
+              </a:rPr>
+              <a:t>distributions.</a:t>
+            </a:r>
+            <a:endParaRPr lang="en-GB" sz="2800" dirty="0">
+              <a:solidFill>
+                <a:srgbClr val="FFFF99"/>
+              </a:solidFill>
+            </a:endParaRPr>
           </a:p>
           <a:p>
             <a:pPr marL="814388" indent="-814388" eaLnBrk="0" hangingPunct="0">
@@ -28092,13 +28409,42 @@
               <a:buAutoNum type="arabicPeriod"/>
             </a:pPr>
             <a:r>
-              <a:rPr lang="en-GB" sz="2800">
+              <a:rPr lang="en-GB" sz="2800" dirty="0">
                 <a:solidFill>
                   <a:srgbClr val="FFFF99"/>
                 </a:solidFill>
               </a:rPr>
-              <a:t>Parametric vs non-parametric statistics</a:t>
-            </a:r>
+              <a:t>Parametric </a:t>
+            </a:r>
+            <a:r>
+              <a:rPr lang="en-GB" sz="2800" dirty="0" err="1">
+                <a:solidFill>
+                  <a:srgbClr val="FFFF99"/>
+                </a:solidFill>
+              </a:rPr>
+              <a:t>vs</a:t>
+            </a:r>
+            <a:r>
+              <a:rPr lang="en-GB" sz="2800" dirty="0">
+                <a:solidFill>
+                  <a:srgbClr val="FFFF99"/>
+                </a:solidFill>
+              </a:rPr>
+              <a:t> non-parametric </a:t>
+            </a:r>
+            <a:r>
+              <a:rPr lang="en-GB" sz="2800" dirty="0" smtClean="0">
+                <a:solidFill>
+                  <a:srgbClr val="FFFF99"/>
+                </a:solidFill>
+              </a:rPr>
+              <a:t>statistics.</a:t>
+            </a:r>
+            <a:endParaRPr lang="en-GB" sz="2800" dirty="0">
+              <a:solidFill>
+                <a:srgbClr val="FFFF99"/>
+              </a:solidFill>
+            </a:endParaRPr>
           </a:p>
           <a:p>
             <a:pPr marL="814388" indent="-814388" eaLnBrk="0" hangingPunct="0">
@@ -28111,7 +28457,7 @@
               <a:buFontTx/>
               <a:buChar char="-"/>
             </a:pPr>
-            <a:endParaRPr lang="en-GB" sz="2800">
+            <a:endParaRPr lang="en-GB" sz="2800" dirty="0">
               <a:solidFill>
                 <a:srgbClr val="FFFF99"/>
               </a:solidFill>
@@ -28126,7 +28472,7 @@
                 <a:spcPct val="20000"/>
               </a:spcBef>
             </a:pPr>
-            <a:endParaRPr lang="en-GB" sz="2800"/>
+            <a:endParaRPr lang="en-GB" sz="2800" dirty="0"/>
           </a:p>
           <a:p>
             <a:pPr marL="814388" indent="-814388" eaLnBrk="0" hangingPunct="0">
@@ -28137,7 +28483,7 @@
                 <a:spcPct val="20000"/>
               </a:spcBef>
             </a:pPr>
-            <a:endParaRPr lang="en-GB" sz="2800"/>
+            <a:endParaRPr lang="en-GB" sz="2800" dirty="0"/>
           </a:p>
           <a:p>
             <a:pPr marL="814388" indent="-814388" eaLnBrk="0" hangingPunct="0">
@@ -28149,7 +28495,7 @@
               </a:spcBef>
             </a:pPr>
             <a:r>
-              <a:rPr lang="en-GB" sz="2800"/>
+              <a:rPr lang="en-GB" sz="2800" dirty="0"/>
               <a:t>			</a:t>
             </a:r>
           </a:p>

</xml_diff>